<commit_message>
[pep-602] Increase full bugfix support to 18 months based on feedback
</commit_message>
<xml_diff>
--- a/pep-0602-overlapping-support-matrix.pptx
+++ b/pep-0602-overlapping-support-matrix.pptx
@@ -2,19 +2,19 @@
 <file path=ppt/presentation.xml><?xml version="1.0" encoding="utf-8"?>
 <p:presentation xmlns:a="http://schemas.openxmlformats.org/drawingml/2006/main" xmlns:r="http://schemas.openxmlformats.org/officeDocument/2006/relationships" xmlns:p="http://schemas.openxmlformats.org/presentationml/2006/main" saveSubsetFonts="1" autoCompressPictures="0">
   <p:sldMasterIdLst>
-    <p:sldMasterId id="2147483648" r:id="rId1"/>
+    <p:sldMasterId id="2147483684" r:id="rId1"/>
   </p:sldMasterIdLst>
   <p:sldIdLst>
     <p:sldId id="256" r:id="rId2"/>
   </p:sldIdLst>
-  <p:sldSz cx="12192000" cy="6858000"/>
+  <p:sldSz cx="6119813" cy="6480175"/>
   <p:notesSz cx="6858000" cy="9144000"/>
   <p:defaultTextStyle>
     <a:defPPr>
       <a:defRPr lang="pl-PL"/>
     </a:defPPr>
-    <a:lvl1pPr marL="0" algn="l" defTabSz="914400" rtl="0" eaLnBrk="1" latinLnBrk="0" hangingPunct="1">
-      <a:defRPr sz="1800" kern="1200">
+    <a:lvl1pPr marL="0" algn="l" defTabSz="863732" rtl="0" eaLnBrk="1" latinLnBrk="0" hangingPunct="1">
+      <a:defRPr sz="1700" kern="1200">
         <a:solidFill>
           <a:schemeClr val="tx1"/>
         </a:solidFill>
@@ -23,8 +23,8 @@
         <a:cs typeface="+mn-cs"/>
       </a:defRPr>
     </a:lvl1pPr>
-    <a:lvl2pPr marL="457200" algn="l" defTabSz="914400" rtl="0" eaLnBrk="1" latinLnBrk="0" hangingPunct="1">
-      <a:defRPr sz="1800" kern="1200">
+    <a:lvl2pPr marL="431865" algn="l" defTabSz="863732" rtl="0" eaLnBrk="1" latinLnBrk="0" hangingPunct="1">
+      <a:defRPr sz="1700" kern="1200">
         <a:solidFill>
           <a:schemeClr val="tx1"/>
         </a:solidFill>
@@ -33,8 +33,8 @@
         <a:cs typeface="+mn-cs"/>
       </a:defRPr>
     </a:lvl2pPr>
-    <a:lvl3pPr marL="914400" algn="l" defTabSz="914400" rtl="0" eaLnBrk="1" latinLnBrk="0" hangingPunct="1">
-      <a:defRPr sz="1800" kern="1200">
+    <a:lvl3pPr marL="863732" algn="l" defTabSz="863732" rtl="0" eaLnBrk="1" latinLnBrk="0" hangingPunct="1">
+      <a:defRPr sz="1700" kern="1200">
         <a:solidFill>
           <a:schemeClr val="tx1"/>
         </a:solidFill>
@@ -43,8 +43,8 @@
         <a:cs typeface="+mn-cs"/>
       </a:defRPr>
     </a:lvl3pPr>
-    <a:lvl4pPr marL="1371600" algn="l" defTabSz="914400" rtl="0" eaLnBrk="1" latinLnBrk="0" hangingPunct="1">
-      <a:defRPr sz="1800" kern="1200">
+    <a:lvl4pPr marL="1295597" algn="l" defTabSz="863732" rtl="0" eaLnBrk="1" latinLnBrk="0" hangingPunct="1">
+      <a:defRPr sz="1700" kern="1200">
         <a:solidFill>
           <a:schemeClr val="tx1"/>
         </a:solidFill>
@@ -53,8 +53,8 @@
         <a:cs typeface="+mn-cs"/>
       </a:defRPr>
     </a:lvl4pPr>
-    <a:lvl5pPr marL="1828800" algn="l" defTabSz="914400" rtl="0" eaLnBrk="1" latinLnBrk="0" hangingPunct="1">
-      <a:defRPr sz="1800" kern="1200">
+    <a:lvl5pPr marL="1727463" algn="l" defTabSz="863732" rtl="0" eaLnBrk="1" latinLnBrk="0" hangingPunct="1">
+      <a:defRPr sz="1700" kern="1200">
         <a:solidFill>
           <a:schemeClr val="tx1"/>
         </a:solidFill>
@@ -63,8 +63,8 @@
         <a:cs typeface="+mn-cs"/>
       </a:defRPr>
     </a:lvl5pPr>
-    <a:lvl6pPr marL="2286000" algn="l" defTabSz="914400" rtl="0" eaLnBrk="1" latinLnBrk="0" hangingPunct="1">
-      <a:defRPr sz="1800" kern="1200">
+    <a:lvl6pPr marL="2159328" algn="l" defTabSz="863732" rtl="0" eaLnBrk="1" latinLnBrk="0" hangingPunct="1">
+      <a:defRPr sz="1700" kern="1200">
         <a:solidFill>
           <a:schemeClr val="tx1"/>
         </a:solidFill>
@@ -73,8 +73,8 @@
         <a:cs typeface="+mn-cs"/>
       </a:defRPr>
     </a:lvl6pPr>
-    <a:lvl7pPr marL="2743200" algn="l" defTabSz="914400" rtl="0" eaLnBrk="1" latinLnBrk="0" hangingPunct="1">
-      <a:defRPr sz="1800" kern="1200">
+    <a:lvl7pPr marL="2591196" algn="l" defTabSz="863732" rtl="0" eaLnBrk="1" latinLnBrk="0" hangingPunct="1">
+      <a:defRPr sz="1700" kern="1200">
         <a:solidFill>
           <a:schemeClr val="tx1"/>
         </a:solidFill>
@@ -83,8 +83,8 @@
         <a:cs typeface="+mn-cs"/>
       </a:defRPr>
     </a:lvl7pPr>
-    <a:lvl8pPr marL="3200400" algn="l" defTabSz="914400" rtl="0" eaLnBrk="1" latinLnBrk="0" hangingPunct="1">
-      <a:defRPr sz="1800" kern="1200">
+    <a:lvl8pPr marL="3023061" algn="l" defTabSz="863732" rtl="0" eaLnBrk="1" latinLnBrk="0" hangingPunct="1">
+      <a:defRPr sz="1700" kern="1200">
         <a:solidFill>
           <a:schemeClr val="tx1"/>
         </a:solidFill>
@@ -93,8 +93,8 @@
         <a:cs typeface="+mn-cs"/>
       </a:defRPr>
     </a:lvl8pPr>
-    <a:lvl9pPr marL="3657600" algn="l" defTabSz="914400" rtl="0" eaLnBrk="1" latinLnBrk="0" hangingPunct="1">
-      <a:defRPr sz="1800" kern="1200">
+    <a:lvl9pPr marL="3454926" algn="l" defTabSz="863732" rtl="0" eaLnBrk="1" latinLnBrk="0" hangingPunct="1">
+      <a:defRPr sz="1700" kern="1200">
         <a:solidFill>
           <a:schemeClr val="tx1"/>
         </a:solidFill>
@@ -104,6 +104,11 @@
       </a:defRPr>
     </a:lvl9pPr>
   </p:defaultTextStyle>
+  <p:extLst>
+    <p:ext uri="{EFAFB233-063F-42B5-8137-9DF3F51BA10A}">
+      <p15:sldGuideLst xmlns:p15="http://schemas.microsoft.com/office/powerpoint/2012/main"/>
+    </p:ext>
+  </p:extLst>
 </p:presentation>
 </file>
 
@@ -126,13 +131,7 @@
       </p:grpSpPr>
       <p:sp>
         <p:nvSpPr>
-          <p:cNvPr id="2" name="Title 1">
-            <a:extLst>
-              <a:ext uri="{FF2B5EF4-FFF2-40B4-BE49-F238E27FC236}">
-                <a16:creationId xmlns:a16="http://schemas.microsoft.com/office/drawing/2014/main" id="{0E35258C-074C-A648-BB6A-7874538B7275}"/>
-              </a:ext>
-            </a:extLst>
-          </p:cNvPr>
+          <p:cNvPr id="2" name="Title 1"/>
           <p:cNvSpPr>
             <a:spLocks noGrp="1"/>
           </p:cNvSpPr>
@@ -142,15 +141,15 @@
         </p:nvSpPr>
         <p:spPr>
           <a:xfrm>
-            <a:off x="1524000" y="1122363"/>
-            <a:ext cx="9144000" cy="2387600"/>
+            <a:off x="458986" y="1060529"/>
+            <a:ext cx="5201841" cy="2256061"/>
           </a:xfrm>
         </p:spPr>
         <p:txBody>
           <a:bodyPr anchor="b"/>
           <a:lstStyle>
             <a:lvl1pPr algn="ctr">
-              <a:defRPr sz="6000"/>
+              <a:defRPr sz="4016"/>
             </a:lvl1pPr>
           </a:lstStyle>
           <a:p>
@@ -158,18 +157,13 @@
               <a:rPr lang="en-US"/>
               <a:t>Click to edit Master title style</a:t>
             </a:r>
-          </a:p>
-        </p:txBody>
-      </p:sp>
-      <p:sp>
-        <p:nvSpPr>
-          <p:cNvPr id="3" name="Subtitle 2">
-            <a:extLst>
-              <a:ext uri="{FF2B5EF4-FFF2-40B4-BE49-F238E27FC236}">
-                <a16:creationId xmlns:a16="http://schemas.microsoft.com/office/drawing/2014/main" id="{17A0D790-36F6-5E4C-96E4-5D2F1EC500E9}"/>
-              </a:ext>
-            </a:extLst>
-          </p:cNvPr>
+            <a:endParaRPr lang="en-US" dirty="0"/>
+          </a:p>
+        </p:txBody>
+      </p:sp>
+      <p:sp>
+        <p:nvSpPr>
+          <p:cNvPr id="3" name="Subtitle 2"/>
           <p:cNvSpPr>
             <a:spLocks noGrp="1"/>
           </p:cNvSpPr>
@@ -179,8 +173,8 @@
         </p:nvSpPr>
         <p:spPr>
           <a:xfrm>
-            <a:off x="1524000" y="3602038"/>
-            <a:ext cx="9144000" cy="1655762"/>
+            <a:off x="764977" y="3403592"/>
+            <a:ext cx="4589860" cy="1564542"/>
           </a:xfrm>
         </p:spPr>
         <p:txBody>
@@ -188,39 +182,39 @@
           <a:lstStyle>
             <a:lvl1pPr marL="0" indent="0" algn="ctr">
               <a:buNone/>
-              <a:defRPr sz="2400"/>
+              <a:defRPr sz="1606"/>
             </a:lvl1pPr>
-            <a:lvl2pPr marL="457200" indent="0" algn="ctr">
+            <a:lvl2pPr marL="306004" indent="0" algn="ctr">
               <a:buNone/>
-              <a:defRPr sz="2000"/>
+              <a:defRPr sz="1339"/>
             </a:lvl2pPr>
-            <a:lvl3pPr marL="914400" indent="0" algn="ctr">
+            <a:lvl3pPr marL="612008" indent="0" algn="ctr">
               <a:buNone/>
-              <a:defRPr sz="1800"/>
+              <a:defRPr sz="1205"/>
             </a:lvl3pPr>
-            <a:lvl4pPr marL="1371600" indent="0" algn="ctr">
+            <a:lvl4pPr marL="918012" indent="0" algn="ctr">
               <a:buNone/>
-              <a:defRPr sz="1600"/>
+              <a:defRPr sz="1071"/>
             </a:lvl4pPr>
-            <a:lvl5pPr marL="1828800" indent="0" algn="ctr">
+            <a:lvl5pPr marL="1224016" indent="0" algn="ctr">
               <a:buNone/>
-              <a:defRPr sz="1600"/>
+              <a:defRPr sz="1071"/>
             </a:lvl5pPr>
-            <a:lvl6pPr marL="2286000" indent="0" algn="ctr">
+            <a:lvl6pPr marL="1530020" indent="0" algn="ctr">
               <a:buNone/>
-              <a:defRPr sz="1600"/>
+              <a:defRPr sz="1071"/>
             </a:lvl6pPr>
-            <a:lvl7pPr marL="2743200" indent="0" algn="ctr">
+            <a:lvl7pPr marL="1836024" indent="0" algn="ctr">
               <a:buNone/>
-              <a:defRPr sz="1600"/>
+              <a:defRPr sz="1071"/>
             </a:lvl7pPr>
-            <a:lvl8pPr marL="3200400" indent="0" algn="ctr">
+            <a:lvl8pPr marL="2142028" indent="0" algn="ctr">
               <a:buNone/>
-              <a:defRPr sz="1600"/>
+              <a:defRPr sz="1071"/>
             </a:lvl8pPr>
-            <a:lvl9pPr marL="3657600" indent="0" algn="ctr">
+            <a:lvl9pPr marL="2448032" indent="0" algn="ctr">
               <a:buNone/>
-              <a:defRPr sz="1600"/>
+              <a:defRPr sz="1071"/>
             </a:lvl9pPr>
           </a:lstStyle>
           <a:p>
@@ -228,18 +222,13 @@
               <a:rPr lang="en-US"/>
               <a:t>Click to edit Master subtitle style</a:t>
             </a:r>
-          </a:p>
-        </p:txBody>
-      </p:sp>
-      <p:sp>
-        <p:nvSpPr>
-          <p:cNvPr id="4" name="Date Placeholder 3">
-            <a:extLst>
-              <a:ext uri="{FF2B5EF4-FFF2-40B4-BE49-F238E27FC236}">
-                <a16:creationId xmlns:a16="http://schemas.microsoft.com/office/drawing/2014/main" id="{20CF839C-D352-154D-A93E-779014797C3C}"/>
-              </a:ext>
-            </a:extLst>
-          </p:cNvPr>
+            <a:endParaRPr lang="en-US" dirty="0"/>
+          </a:p>
+        </p:txBody>
+      </p:sp>
+      <p:sp>
+        <p:nvSpPr>
+          <p:cNvPr id="4" name="Date Placeholder 3"/>
           <p:cNvSpPr>
             <a:spLocks noGrp="1"/>
           </p:cNvSpPr>
@@ -254,7 +243,7 @@
           <a:p>
             <a:fld id="{2412A0D1-1243-3144-AEF2-A5C0AB2FFF96}" type="datetimeFigureOut">
               <a:rPr lang="en-US" smtClean="0"/>
-              <a:t>9/10/19</a:t>
+              <a:t>9/12/19</a:t>
             </a:fld>
             <a:endParaRPr lang="en-US"/>
           </a:p>
@@ -262,13 +251,7 @@
       </p:sp>
       <p:sp>
         <p:nvSpPr>
-          <p:cNvPr id="5" name="Footer Placeholder 4">
-            <a:extLst>
-              <a:ext uri="{FF2B5EF4-FFF2-40B4-BE49-F238E27FC236}">
-                <a16:creationId xmlns:a16="http://schemas.microsoft.com/office/drawing/2014/main" id="{609FA9E2-A794-D34A-98B2-8BBEA64EE364}"/>
-              </a:ext>
-            </a:extLst>
-          </p:cNvPr>
+          <p:cNvPr id="5" name="Footer Placeholder 4"/>
           <p:cNvSpPr>
             <a:spLocks noGrp="1"/>
           </p:cNvSpPr>
@@ -287,13 +270,7 @@
       </p:sp>
       <p:sp>
         <p:nvSpPr>
-          <p:cNvPr id="6" name="Slide Number Placeholder 5">
-            <a:extLst>
-              <a:ext uri="{FF2B5EF4-FFF2-40B4-BE49-F238E27FC236}">
-                <a16:creationId xmlns:a16="http://schemas.microsoft.com/office/drawing/2014/main" id="{F3114855-92BE-1042-AC16-3094BADE066B}"/>
-              </a:ext>
-            </a:extLst>
-          </p:cNvPr>
+          <p:cNvPr id="6" name="Slide Number Placeholder 5"/>
           <p:cNvSpPr>
             <a:spLocks noGrp="1"/>
           </p:cNvSpPr>
@@ -317,7 +294,7 @@
     </p:spTree>
     <p:extLst>
       <p:ext uri="{BB962C8B-B14F-4D97-AF65-F5344CB8AC3E}">
-        <p14:creationId xmlns:p14="http://schemas.microsoft.com/office/powerpoint/2010/main" val="3642717265"/>
+        <p14:creationId xmlns:p14="http://schemas.microsoft.com/office/powerpoint/2010/main" val="85319702"/>
       </p:ext>
     </p:extLst>
   </p:cSld>
@@ -346,13 +323,7 @@
       </p:grpSpPr>
       <p:sp>
         <p:nvSpPr>
-          <p:cNvPr id="2" name="Title 1">
-            <a:extLst>
-              <a:ext uri="{FF2B5EF4-FFF2-40B4-BE49-F238E27FC236}">
-                <a16:creationId xmlns:a16="http://schemas.microsoft.com/office/drawing/2014/main" id="{F340F9F7-F401-294E-856D-DCD2F80C11EC}"/>
-              </a:ext>
-            </a:extLst>
-          </p:cNvPr>
+          <p:cNvPr id="2" name="Title 1"/>
           <p:cNvSpPr>
             <a:spLocks noGrp="1"/>
           </p:cNvSpPr>
@@ -369,18 +340,13 @@
               <a:rPr lang="en-US"/>
               <a:t>Click to edit Master title style</a:t>
             </a:r>
-          </a:p>
-        </p:txBody>
-      </p:sp>
-      <p:sp>
-        <p:nvSpPr>
-          <p:cNvPr id="3" name="Vertical Text Placeholder 2">
-            <a:extLst>
-              <a:ext uri="{FF2B5EF4-FFF2-40B4-BE49-F238E27FC236}">
-                <a16:creationId xmlns:a16="http://schemas.microsoft.com/office/drawing/2014/main" id="{1F4FAFC7-0674-304E-BFFE-52D126CDEBE3}"/>
-              </a:ext>
-            </a:extLst>
-          </p:cNvPr>
+            <a:endParaRPr lang="en-US" dirty="0"/>
+          </a:p>
+        </p:txBody>
+      </p:sp>
+      <p:sp>
+        <p:nvSpPr>
+          <p:cNvPr id="3" name="Vertical Text Placeholder 2"/>
           <p:cNvSpPr>
             <a:spLocks noGrp="1"/>
           </p:cNvSpPr>
@@ -426,18 +392,13 @@
               <a:rPr lang="en-US"/>
               <a:t>Fifth level</a:t>
             </a:r>
-          </a:p>
-        </p:txBody>
-      </p:sp>
-      <p:sp>
-        <p:nvSpPr>
-          <p:cNvPr id="4" name="Date Placeholder 3">
-            <a:extLst>
-              <a:ext uri="{FF2B5EF4-FFF2-40B4-BE49-F238E27FC236}">
-                <a16:creationId xmlns:a16="http://schemas.microsoft.com/office/drawing/2014/main" id="{8570693B-5728-0C4B-8099-9806D42398F6}"/>
-              </a:ext>
-            </a:extLst>
-          </p:cNvPr>
+            <a:endParaRPr lang="en-US" dirty="0"/>
+          </a:p>
+        </p:txBody>
+      </p:sp>
+      <p:sp>
+        <p:nvSpPr>
+          <p:cNvPr id="4" name="Date Placeholder 3"/>
           <p:cNvSpPr>
             <a:spLocks noGrp="1"/>
           </p:cNvSpPr>
@@ -452,7 +413,7 @@
           <a:p>
             <a:fld id="{2412A0D1-1243-3144-AEF2-A5C0AB2FFF96}" type="datetimeFigureOut">
               <a:rPr lang="en-US" smtClean="0"/>
-              <a:t>9/10/19</a:t>
+              <a:t>9/12/19</a:t>
             </a:fld>
             <a:endParaRPr lang="en-US"/>
           </a:p>
@@ -460,13 +421,7 @@
       </p:sp>
       <p:sp>
         <p:nvSpPr>
-          <p:cNvPr id="5" name="Footer Placeholder 4">
-            <a:extLst>
-              <a:ext uri="{FF2B5EF4-FFF2-40B4-BE49-F238E27FC236}">
-                <a16:creationId xmlns:a16="http://schemas.microsoft.com/office/drawing/2014/main" id="{932CC580-784F-224F-A4A0-409F0D5AB2E0}"/>
-              </a:ext>
-            </a:extLst>
-          </p:cNvPr>
+          <p:cNvPr id="5" name="Footer Placeholder 4"/>
           <p:cNvSpPr>
             <a:spLocks noGrp="1"/>
           </p:cNvSpPr>
@@ -485,13 +440,7 @@
       </p:sp>
       <p:sp>
         <p:nvSpPr>
-          <p:cNvPr id="6" name="Slide Number Placeholder 5">
-            <a:extLst>
-              <a:ext uri="{FF2B5EF4-FFF2-40B4-BE49-F238E27FC236}">
-                <a16:creationId xmlns:a16="http://schemas.microsoft.com/office/drawing/2014/main" id="{34EC7895-5EE4-4344-95C7-63D53B1C463A}"/>
-              </a:ext>
-            </a:extLst>
-          </p:cNvPr>
+          <p:cNvPr id="6" name="Slide Number Placeholder 5"/>
           <p:cNvSpPr>
             <a:spLocks noGrp="1"/>
           </p:cNvSpPr>
@@ -515,7 +464,7 @@
     </p:spTree>
     <p:extLst>
       <p:ext uri="{BB962C8B-B14F-4D97-AF65-F5344CB8AC3E}">
-        <p14:creationId xmlns:p14="http://schemas.microsoft.com/office/powerpoint/2010/main" val="1729639714"/>
+        <p14:creationId xmlns:p14="http://schemas.microsoft.com/office/powerpoint/2010/main" val="2909932439"/>
       </p:ext>
     </p:extLst>
   </p:cSld>
@@ -544,13 +493,7 @@
       </p:grpSpPr>
       <p:sp>
         <p:nvSpPr>
-          <p:cNvPr id="2" name="Vertical Title 1">
-            <a:extLst>
-              <a:ext uri="{FF2B5EF4-FFF2-40B4-BE49-F238E27FC236}">
-                <a16:creationId xmlns:a16="http://schemas.microsoft.com/office/drawing/2014/main" id="{7CA5DC19-3585-0B4F-95E8-B99AB924F2DE}"/>
-              </a:ext>
-            </a:extLst>
-          </p:cNvPr>
+          <p:cNvPr id="2" name="Vertical Title 1"/>
           <p:cNvSpPr>
             <a:spLocks noGrp="1"/>
           </p:cNvSpPr>
@@ -560,8 +503,8 @@
         </p:nvSpPr>
         <p:spPr>
           <a:xfrm>
-            <a:off x="8724900" y="365125"/>
-            <a:ext cx="2628900" cy="5811838"/>
+            <a:off x="4379491" y="345009"/>
+            <a:ext cx="1319585" cy="5491649"/>
           </a:xfrm>
         </p:spPr>
         <p:txBody>
@@ -572,18 +515,13 @@
               <a:rPr lang="en-US"/>
               <a:t>Click to edit Master title style</a:t>
             </a:r>
-          </a:p>
-        </p:txBody>
-      </p:sp>
-      <p:sp>
-        <p:nvSpPr>
-          <p:cNvPr id="3" name="Vertical Text Placeholder 2">
-            <a:extLst>
-              <a:ext uri="{FF2B5EF4-FFF2-40B4-BE49-F238E27FC236}">
-                <a16:creationId xmlns:a16="http://schemas.microsoft.com/office/drawing/2014/main" id="{9FC8D92E-F9EB-1F42-A923-C3E70B7E2949}"/>
-              </a:ext>
-            </a:extLst>
-          </p:cNvPr>
+            <a:endParaRPr lang="en-US" dirty="0"/>
+          </a:p>
+        </p:txBody>
+      </p:sp>
+      <p:sp>
+        <p:nvSpPr>
+          <p:cNvPr id="3" name="Vertical Text Placeholder 2"/>
           <p:cNvSpPr>
             <a:spLocks noGrp="1"/>
           </p:cNvSpPr>
@@ -593,8 +531,8 @@
         </p:nvSpPr>
         <p:spPr>
           <a:xfrm>
-            <a:off x="838200" y="365125"/>
-            <a:ext cx="7734300" cy="5811838"/>
+            <a:off x="420738" y="345009"/>
+            <a:ext cx="3882256" cy="5491649"/>
           </a:xfrm>
         </p:spPr>
         <p:txBody>
@@ -634,18 +572,13 @@
               <a:rPr lang="en-US"/>
               <a:t>Fifth level</a:t>
             </a:r>
-          </a:p>
-        </p:txBody>
-      </p:sp>
-      <p:sp>
-        <p:nvSpPr>
-          <p:cNvPr id="4" name="Date Placeholder 3">
-            <a:extLst>
-              <a:ext uri="{FF2B5EF4-FFF2-40B4-BE49-F238E27FC236}">
-                <a16:creationId xmlns:a16="http://schemas.microsoft.com/office/drawing/2014/main" id="{386A4A03-0193-F243-9606-E1DD62AB1811}"/>
-              </a:ext>
-            </a:extLst>
-          </p:cNvPr>
+            <a:endParaRPr lang="en-US" dirty="0"/>
+          </a:p>
+        </p:txBody>
+      </p:sp>
+      <p:sp>
+        <p:nvSpPr>
+          <p:cNvPr id="4" name="Date Placeholder 3"/>
           <p:cNvSpPr>
             <a:spLocks noGrp="1"/>
           </p:cNvSpPr>
@@ -660,7 +593,7 @@
           <a:p>
             <a:fld id="{2412A0D1-1243-3144-AEF2-A5C0AB2FFF96}" type="datetimeFigureOut">
               <a:rPr lang="en-US" smtClean="0"/>
-              <a:t>9/10/19</a:t>
+              <a:t>9/12/19</a:t>
             </a:fld>
             <a:endParaRPr lang="en-US"/>
           </a:p>
@@ -668,13 +601,7 @@
       </p:sp>
       <p:sp>
         <p:nvSpPr>
-          <p:cNvPr id="5" name="Footer Placeholder 4">
-            <a:extLst>
-              <a:ext uri="{FF2B5EF4-FFF2-40B4-BE49-F238E27FC236}">
-                <a16:creationId xmlns:a16="http://schemas.microsoft.com/office/drawing/2014/main" id="{89CA4FEB-5DC0-654D-A76D-9D137DF522B1}"/>
-              </a:ext>
-            </a:extLst>
-          </p:cNvPr>
+          <p:cNvPr id="5" name="Footer Placeholder 4"/>
           <p:cNvSpPr>
             <a:spLocks noGrp="1"/>
           </p:cNvSpPr>
@@ -693,13 +620,7 @@
       </p:sp>
       <p:sp>
         <p:nvSpPr>
-          <p:cNvPr id="6" name="Slide Number Placeholder 5">
-            <a:extLst>
-              <a:ext uri="{FF2B5EF4-FFF2-40B4-BE49-F238E27FC236}">
-                <a16:creationId xmlns:a16="http://schemas.microsoft.com/office/drawing/2014/main" id="{86A39BE4-C96B-F449-9EE3-AA68BD5CB8C4}"/>
-              </a:ext>
-            </a:extLst>
-          </p:cNvPr>
+          <p:cNvPr id="6" name="Slide Number Placeholder 5"/>
           <p:cNvSpPr>
             <a:spLocks noGrp="1"/>
           </p:cNvSpPr>
@@ -723,7 +644,7 @@
     </p:spTree>
     <p:extLst>
       <p:ext uri="{BB962C8B-B14F-4D97-AF65-F5344CB8AC3E}">
-        <p14:creationId xmlns:p14="http://schemas.microsoft.com/office/powerpoint/2010/main" val="1082552802"/>
+        <p14:creationId xmlns:p14="http://schemas.microsoft.com/office/powerpoint/2010/main" val="2009324308"/>
       </p:ext>
     </p:extLst>
   </p:cSld>
@@ -752,13 +673,7 @@
       </p:grpSpPr>
       <p:sp>
         <p:nvSpPr>
-          <p:cNvPr id="2" name="Title 1">
-            <a:extLst>
-              <a:ext uri="{FF2B5EF4-FFF2-40B4-BE49-F238E27FC236}">
-                <a16:creationId xmlns:a16="http://schemas.microsoft.com/office/drawing/2014/main" id="{A4D6345F-80D9-2540-A335-0D6EC16A335C}"/>
-              </a:ext>
-            </a:extLst>
-          </p:cNvPr>
+          <p:cNvPr id="2" name="Title 1"/>
           <p:cNvSpPr>
             <a:spLocks noGrp="1"/>
           </p:cNvSpPr>
@@ -775,18 +690,13 @@
               <a:rPr lang="en-US"/>
               <a:t>Click to edit Master title style</a:t>
             </a:r>
-          </a:p>
-        </p:txBody>
-      </p:sp>
-      <p:sp>
-        <p:nvSpPr>
-          <p:cNvPr id="3" name="Content Placeholder 2">
-            <a:extLst>
-              <a:ext uri="{FF2B5EF4-FFF2-40B4-BE49-F238E27FC236}">
-                <a16:creationId xmlns:a16="http://schemas.microsoft.com/office/drawing/2014/main" id="{BB4B37FE-4EDB-F646-BD29-8052FA36EAE2}"/>
-              </a:ext>
-            </a:extLst>
-          </p:cNvPr>
+            <a:endParaRPr lang="en-US" dirty="0"/>
+          </a:p>
+        </p:txBody>
+      </p:sp>
+      <p:sp>
+        <p:nvSpPr>
+          <p:cNvPr id="3" name="Content Placeholder 2"/>
           <p:cNvSpPr>
             <a:spLocks noGrp="1"/>
           </p:cNvSpPr>
@@ -832,18 +742,13 @@
               <a:rPr lang="en-US"/>
               <a:t>Fifth level</a:t>
             </a:r>
-          </a:p>
-        </p:txBody>
-      </p:sp>
-      <p:sp>
-        <p:nvSpPr>
-          <p:cNvPr id="4" name="Date Placeholder 3">
-            <a:extLst>
-              <a:ext uri="{FF2B5EF4-FFF2-40B4-BE49-F238E27FC236}">
-                <a16:creationId xmlns:a16="http://schemas.microsoft.com/office/drawing/2014/main" id="{E64E6406-2F03-CB4D-827C-5E969C89544C}"/>
-              </a:ext>
-            </a:extLst>
-          </p:cNvPr>
+            <a:endParaRPr lang="en-US" dirty="0"/>
+          </a:p>
+        </p:txBody>
+      </p:sp>
+      <p:sp>
+        <p:nvSpPr>
+          <p:cNvPr id="4" name="Date Placeholder 3"/>
           <p:cNvSpPr>
             <a:spLocks noGrp="1"/>
           </p:cNvSpPr>
@@ -858,7 +763,7 @@
           <a:p>
             <a:fld id="{2412A0D1-1243-3144-AEF2-A5C0AB2FFF96}" type="datetimeFigureOut">
               <a:rPr lang="en-US" smtClean="0"/>
-              <a:t>9/10/19</a:t>
+              <a:t>9/12/19</a:t>
             </a:fld>
             <a:endParaRPr lang="en-US"/>
           </a:p>
@@ -866,13 +771,7 @@
       </p:sp>
       <p:sp>
         <p:nvSpPr>
-          <p:cNvPr id="5" name="Footer Placeholder 4">
-            <a:extLst>
-              <a:ext uri="{FF2B5EF4-FFF2-40B4-BE49-F238E27FC236}">
-                <a16:creationId xmlns:a16="http://schemas.microsoft.com/office/drawing/2014/main" id="{710D04EA-17F7-A642-BC41-71CAAACE5920}"/>
-              </a:ext>
-            </a:extLst>
-          </p:cNvPr>
+          <p:cNvPr id="5" name="Footer Placeholder 4"/>
           <p:cNvSpPr>
             <a:spLocks noGrp="1"/>
           </p:cNvSpPr>
@@ -891,13 +790,7 @@
       </p:sp>
       <p:sp>
         <p:nvSpPr>
-          <p:cNvPr id="6" name="Slide Number Placeholder 5">
-            <a:extLst>
-              <a:ext uri="{FF2B5EF4-FFF2-40B4-BE49-F238E27FC236}">
-                <a16:creationId xmlns:a16="http://schemas.microsoft.com/office/drawing/2014/main" id="{AE74F547-E3C8-1C4D-A098-DC1687372A9B}"/>
-              </a:ext>
-            </a:extLst>
-          </p:cNvPr>
+          <p:cNvPr id="6" name="Slide Number Placeholder 5"/>
           <p:cNvSpPr>
             <a:spLocks noGrp="1"/>
           </p:cNvSpPr>
@@ -921,7 +814,7 @@
     </p:spTree>
     <p:extLst>
       <p:ext uri="{BB962C8B-B14F-4D97-AF65-F5344CB8AC3E}">
-        <p14:creationId xmlns:p14="http://schemas.microsoft.com/office/powerpoint/2010/main" val="2539522143"/>
+        <p14:creationId xmlns:p14="http://schemas.microsoft.com/office/powerpoint/2010/main" val="533734021"/>
       </p:ext>
     </p:extLst>
   </p:cSld>
@@ -950,13 +843,7 @@
       </p:grpSpPr>
       <p:sp>
         <p:nvSpPr>
-          <p:cNvPr id="2" name="Title 1">
-            <a:extLst>
-              <a:ext uri="{FF2B5EF4-FFF2-40B4-BE49-F238E27FC236}">
-                <a16:creationId xmlns:a16="http://schemas.microsoft.com/office/drawing/2014/main" id="{B1041869-9DC4-C045-9560-82BAE77D279B}"/>
-              </a:ext>
-            </a:extLst>
-          </p:cNvPr>
+          <p:cNvPr id="2" name="Title 1"/>
           <p:cNvSpPr>
             <a:spLocks noGrp="1"/>
           </p:cNvSpPr>
@@ -966,15 +853,15 @@
         </p:nvSpPr>
         <p:spPr>
           <a:xfrm>
-            <a:off x="831850" y="1709738"/>
-            <a:ext cx="10515600" cy="2852737"/>
+            <a:off x="417550" y="1615546"/>
+            <a:ext cx="5278339" cy="2695572"/>
           </a:xfrm>
         </p:spPr>
         <p:txBody>
           <a:bodyPr anchor="b"/>
           <a:lstStyle>
             <a:lvl1pPr>
-              <a:defRPr sz="6000"/>
+              <a:defRPr sz="4016"/>
             </a:lvl1pPr>
           </a:lstStyle>
           <a:p>
@@ -982,18 +869,13 @@
               <a:rPr lang="en-US"/>
               <a:t>Click to edit Master title style</a:t>
             </a:r>
-          </a:p>
-        </p:txBody>
-      </p:sp>
-      <p:sp>
-        <p:nvSpPr>
-          <p:cNvPr id="3" name="Text Placeholder 2">
-            <a:extLst>
-              <a:ext uri="{FF2B5EF4-FFF2-40B4-BE49-F238E27FC236}">
-                <a16:creationId xmlns:a16="http://schemas.microsoft.com/office/drawing/2014/main" id="{35AD0F58-E1E7-4649-A695-96448C8F166A}"/>
-              </a:ext>
-            </a:extLst>
-          </p:cNvPr>
+            <a:endParaRPr lang="en-US" dirty="0"/>
+          </a:p>
+        </p:txBody>
+      </p:sp>
+      <p:sp>
+        <p:nvSpPr>
+          <p:cNvPr id="3" name="Text Placeholder 2"/>
           <p:cNvSpPr>
             <a:spLocks noGrp="1"/>
           </p:cNvSpPr>
@@ -1003,8 +885,8 @@
         </p:nvSpPr>
         <p:spPr>
           <a:xfrm>
-            <a:off x="831850" y="4589463"/>
-            <a:ext cx="10515600" cy="1500187"/>
+            <a:off x="417550" y="4336619"/>
+            <a:ext cx="5278339" cy="1417538"/>
           </a:xfrm>
         </p:spPr>
         <p:txBody>
@@ -1012,17 +894,15 @@
           <a:lstStyle>
             <a:lvl1pPr marL="0" indent="0">
               <a:buNone/>
-              <a:defRPr sz="2400">
+              <a:defRPr sz="1606">
                 <a:solidFill>
-                  <a:schemeClr val="tx1">
-                    <a:tint val="75000"/>
-                  </a:schemeClr>
+                  <a:schemeClr val="tx1"/>
                 </a:solidFill>
               </a:defRPr>
             </a:lvl1pPr>
-            <a:lvl2pPr marL="457200" indent="0">
+            <a:lvl2pPr marL="306004" indent="0">
               <a:buNone/>
-              <a:defRPr sz="2000">
+              <a:defRPr sz="1339">
                 <a:solidFill>
                   <a:schemeClr val="tx1">
                     <a:tint val="75000"/>
@@ -1030,9 +910,9 @@
                 </a:solidFill>
               </a:defRPr>
             </a:lvl2pPr>
-            <a:lvl3pPr marL="914400" indent="0">
+            <a:lvl3pPr marL="612008" indent="0">
               <a:buNone/>
-              <a:defRPr sz="1800">
+              <a:defRPr sz="1205">
                 <a:solidFill>
                   <a:schemeClr val="tx1">
                     <a:tint val="75000"/>
@@ -1040,9 +920,9 @@
                 </a:solidFill>
               </a:defRPr>
             </a:lvl3pPr>
-            <a:lvl4pPr marL="1371600" indent="0">
+            <a:lvl4pPr marL="918012" indent="0">
               <a:buNone/>
-              <a:defRPr sz="1600">
+              <a:defRPr sz="1071">
                 <a:solidFill>
                   <a:schemeClr val="tx1">
                     <a:tint val="75000"/>
@@ -1050,9 +930,9 @@
                 </a:solidFill>
               </a:defRPr>
             </a:lvl4pPr>
-            <a:lvl5pPr marL="1828800" indent="0">
+            <a:lvl5pPr marL="1224016" indent="0">
               <a:buNone/>
-              <a:defRPr sz="1600">
+              <a:defRPr sz="1071">
                 <a:solidFill>
                   <a:schemeClr val="tx1">
                     <a:tint val="75000"/>
@@ -1060,9 +940,9 @@
                 </a:solidFill>
               </a:defRPr>
             </a:lvl5pPr>
-            <a:lvl6pPr marL="2286000" indent="0">
+            <a:lvl6pPr marL="1530020" indent="0">
               <a:buNone/>
-              <a:defRPr sz="1600">
+              <a:defRPr sz="1071">
                 <a:solidFill>
                   <a:schemeClr val="tx1">
                     <a:tint val="75000"/>
@@ -1070,9 +950,9 @@
                 </a:solidFill>
               </a:defRPr>
             </a:lvl6pPr>
-            <a:lvl7pPr marL="2743200" indent="0">
+            <a:lvl7pPr marL="1836024" indent="0">
               <a:buNone/>
-              <a:defRPr sz="1600">
+              <a:defRPr sz="1071">
                 <a:solidFill>
                   <a:schemeClr val="tx1">
                     <a:tint val="75000"/>
@@ -1080,9 +960,9 @@
                 </a:solidFill>
               </a:defRPr>
             </a:lvl7pPr>
-            <a:lvl8pPr marL="3200400" indent="0">
+            <a:lvl8pPr marL="2142028" indent="0">
               <a:buNone/>
-              <a:defRPr sz="1600">
+              <a:defRPr sz="1071">
                 <a:solidFill>
                   <a:schemeClr val="tx1">
                     <a:tint val="75000"/>
@@ -1090,9 +970,9 @@
                 </a:solidFill>
               </a:defRPr>
             </a:lvl8pPr>
-            <a:lvl9pPr marL="3657600" indent="0">
+            <a:lvl9pPr marL="2448032" indent="0">
               <a:buNone/>
-              <a:defRPr sz="1600">
+              <a:defRPr sz="1071">
                 <a:solidFill>
                   <a:schemeClr val="tx1">
                     <a:tint val="75000"/>
@@ -1112,13 +992,7 @@
       </p:sp>
       <p:sp>
         <p:nvSpPr>
-          <p:cNvPr id="4" name="Date Placeholder 3">
-            <a:extLst>
-              <a:ext uri="{FF2B5EF4-FFF2-40B4-BE49-F238E27FC236}">
-                <a16:creationId xmlns:a16="http://schemas.microsoft.com/office/drawing/2014/main" id="{12304E07-48DC-E043-B414-81D472C96E6A}"/>
-              </a:ext>
-            </a:extLst>
-          </p:cNvPr>
+          <p:cNvPr id="4" name="Date Placeholder 3"/>
           <p:cNvSpPr>
             <a:spLocks noGrp="1"/>
           </p:cNvSpPr>
@@ -1133,7 +1007,7 @@
           <a:p>
             <a:fld id="{2412A0D1-1243-3144-AEF2-A5C0AB2FFF96}" type="datetimeFigureOut">
               <a:rPr lang="en-US" smtClean="0"/>
-              <a:t>9/10/19</a:t>
+              <a:t>9/12/19</a:t>
             </a:fld>
             <a:endParaRPr lang="en-US"/>
           </a:p>
@@ -1141,13 +1015,7 @@
       </p:sp>
       <p:sp>
         <p:nvSpPr>
-          <p:cNvPr id="5" name="Footer Placeholder 4">
-            <a:extLst>
-              <a:ext uri="{FF2B5EF4-FFF2-40B4-BE49-F238E27FC236}">
-                <a16:creationId xmlns:a16="http://schemas.microsoft.com/office/drawing/2014/main" id="{49A50A6E-606A-1443-91B7-F3B6484BEC04}"/>
-              </a:ext>
-            </a:extLst>
-          </p:cNvPr>
+          <p:cNvPr id="5" name="Footer Placeholder 4"/>
           <p:cNvSpPr>
             <a:spLocks noGrp="1"/>
           </p:cNvSpPr>
@@ -1166,13 +1034,7 @@
       </p:sp>
       <p:sp>
         <p:nvSpPr>
-          <p:cNvPr id="6" name="Slide Number Placeholder 5">
-            <a:extLst>
-              <a:ext uri="{FF2B5EF4-FFF2-40B4-BE49-F238E27FC236}">
-                <a16:creationId xmlns:a16="http://schemas.microsoft.com/office/drawing/2014/main" id="{8A5204E5-739F-7E4F-8D54-DAE23BCCD633}"/>
-              </a:ext>
-            </a:extLst>
-          </p:cNvPr>
+          <p:cNvPr id="6" name="Slide Number Placeholder 5"/>
           <p:cNvSpPr>
             <a:spLocks noGrp="1"/>
           </p:cNvSpPr>
@@ -1196,7 +1058,7 @@
     </p:spTree>
     <p:extLst>
       <p:ext uri="{BB962C8B-B14F-4D97-AF65-F5344CB8AC3E}">
-        <p14:creationId xmlns:p14="http://schemas.microsoft.com/office/powerpoint/2010/main" val="85919649"/>
+        <p14:creationId xmlns:p14="http://schemas.microsoft.com/office/powerpoint/2010/main" val="3650550778"/>
       </p:ext>
     </p:extLst>
   </p:cSld>
@@ -1225,13 +1087,7 @@
       </p:grpSpPr>
       <p:sp>
         <p:nvSpPr>
-          <p:cNvPr id="2" name="Title 1">
-            <a:extLst>
-              <a:ext uri="{FF2B5EF4-FFF2-40B4-BE49-F238E27FC236}">
-                <a16:creationId xmlns:a16="http://schemas.microsoft.com/office/drawing/2014/main" id="{8DE9B6D2-92BC-6040-B4E3-521436A06EE5}"/>
-              </a:ext>
-            </a:extLst>
-          </p:cNvPr>
+          <p:cNvPr id="2" name="Title 1"/>
           <p:cNvSpPr>
             <a:spLocks noGrp="1"/>
           </p:cNvSpPr>
@@ -1248,18 +1104,13 @@
               <a:rPr lang="en-US"/>
               <a:t>Click to edit Master title style</a:t>
             </a:r>
-          </a:p>
-        </p:txBody>
-      </p:sp>
-      <p:sp>
-        <p:nvSpPr>
-          <p:cNvPr id="3" name="Content Placeholder 2">
-            <a:extLst>
-              <a:ext uri="{FF2B5EF4-FFF2-40B4-BE49-F238E27FC236}">
-                <a16:creationId xmlns:a16="http://schemas.microsoft.com/office/drawing/2014/main" id="{3DF1FD8F-2C1E-A24F-B91C-EC8FB8A8E21A}"/>
-              </a:ext>
-            </a:extLst>
-          </p:cNvPr>
+            <a:endParaRPr lang="en-US" dirty="0"/>
+          </a:p>
+        </p:txBody>
+      </p:sp>
+      <p:sp>
+        <p:nvSpPr>
+          <p:cNvPr id="3" name="Content Placeholder 2"/>
           <p:cNvSpPr>
             <a:spLocks noGrp="1"/>
           </p:cNvSpPr>
@@ -1269,8 +1120,8 @@
         </p:nvSpPr>
         <p:spPr>
           <a:xfrm>
-            <a:off x="838200" y="1825625"/>
-            <a:ext cx="5181600" cy="4351338"/>
+            <a:off x="420737" y="1725046"/>
+            <a:ext cx="2600921" cy="4111612"/>
           </a:xfrm>
         </p:spPr>
         <p:txBody>
@@ -1310,18 +1161,13 @@
               <a:rPr lang="en-US"/>
               <a:t>Fifth level</a:t>
             </a:r>
-          </a:p>
-        </p:txBody>
-      </p:sp>
-      <p:sp>
-        <p:nvSpPr>
-          <p:cNvPr id="4" name="Content Placeholder 3">
-            <a:extLst>
-              <a:ext uri="{FF2B5EF4-FFF2-40B4-BE49-F238E27FC236}">
-                <a16:creationId xmlns:a16="http://schemas.microsoft.com/office/drawing/2014/main" id="{869D2332-E84B-BB44-A22B-FC44C3D4D01A}"/>
-              </a:ext>
-            </a:extLst>
-          </p:cNvPr>
+            <a:endParaRPr lang="en-US" dirty="0"/>
+          </a:p>
+        </p:txBody>
+      </p:sp>
+      <p:sp>
+        <p:nvSpPr>
+          <p:cNvPr id="4" name="Content Placeholder 3"/>
           <p:cNvSpPr>
             <a:spLocks noGrp="1"/>
           </p:cNvSpPr>
@@ -1331,8 +1177,8 @@
         </p:nvSpPr>
         <p:spPr>
           <a:xfrm>
-            <a:off x="6172200" y="1825625"/>
-            <a:ext cx="5181600" cy="4351338"/>
+            <a:off x="3098155" y="1725046"/>
+            <a:ext cx="2600921" cy="4111612"/>
           </a:xfrm>
         </p:spPr>
         <p:txBody>
@@ -1372,18 +1218,13 @@
               <a:rPr lang="en-US"/>
               <a:t>Fifth level</a:t>
             </a:r>
-          </a:p>
-        </p:txBody>
-      </p:sp>
-      <p:sp>
-        <p:nvSpPr>
-          <p:cNvPr id="5" name="Date Placeholder 4">
-            <a:extLst>
-              <a:ext uri="{FF2B5EF4-FFF2-40B4-BE49-F238E27FC236}">
-                <a16:creationId xmlns:a16="http://schemas.microsoft.com/office/drawing/2014/main" id="{6B84F0BB-376F-8443-8F1B-792AF90873E3}"/>
-              </a:ext>
-            </a:extLst>
-          </p:cNvPr>
+            <a:endParaRPr lang="en-US" dirty="0"/>
+          </a:p>
+        </p:txBody>
+      </p:sp>
+      <p:sp>
+        <p:nvSpPr>
+          <p:cNvPr id="5" name="Date Placeholder 4"/>
           <p:cNvSpPr>
             <a:spLocks noGrp="1"/>
           </p:cNvSpPr>
@@ -1398,7 +1239,7 @@
           <a:p>
             <a:fld id="{2412A0D1-1243-3144-AEF2-A5C0AB2FFF96}" type="datetimeFigureOut">
               <a:rPr lang="en-US" smtClean="0"/>
-              <a:t>9/10/19</a:t>
+              <a:t>9/12/19</a:t>
             </a:fld>
             <a:endParaRPr lang="en-US"/>
           </a:p>
@@ -1406,13 +1247,7 @@
       </p:sp>
       <p:sp>
         <p:nvSpPr>
-          <p:cNvPr id="6" name="Footer Placeholder 5">
-            <a:extLst>
-              <a:ext uri="{FF2B5EF4-FFF2-40B4-BE49-F238E27FC236}">
-                <a16:creationId xmlns:a16="http://schemas.microsoft.com/office/drawing/2014/main" id="{29FB1BE1-8DF4-6740-A3EC-F9F60A06512B}"/>
-              </a:ext>
-            </a:extLst>
-          </p:cNvPr>
+          <p:cNvPr id="6" name="Footer Placeholder 5"/>
           <p:cNvSpPr>
             <a:spLocks noGrp="1"/>
           </p:cNvSpPr>
@@ -1431,13 +1266,7 @@
       </p:sp>
       <p:sp>
         <p:nvSpPr>
-          <p:cNvPr id="7" name="Slide Number Placeholder 6">
-            <a:extLst>
-              <a:ext uri="{FF2B5EF4-FFF2-40B4-BE49-F238E27FC236}">
-                <a16:creationId xmlns:a16="http://schemas.microsoft.com/office/drawing/2014/main" id="{DC61D13C-9112-9644-821B-8A78A4F4564E}"/>
-              </a:ext>
-            </a:extLst>
-          </p:cNvPr>
+          <p:cNvPr id="7" name="Slide Number Placeholder 6"/>
           <p:cNvSpPr>
             <a:spLocks noGrp="1"/>
           </p:cNvSpPr>
@@ -1461,7 +1290,7 @@
     </p:spTree>
     <p:extLst>
       <p:ext uri="{BB962C8B-B14F-4D97-AF65-F5344CB8AC3E}">
-        <p14:creationId xmlns:p14="http://schemas.microsoft.com/office/powerpoint/2010/main" val="4114254304"/>
+        <p14:creationId xmlns:p14="http://schemas.microsoft.com/office/powerpoint/2010/main" val="1281115282"/>
       </p:ext>
     </p:extLst>
   </p:cSld>
@@ -1490,13 +1319,7 @@
       </p:grpSpPr>
       <p:sp>
         <p:nvSpPr>
-          <p:cNvPr id="2" name="Title 1">
-            <a:extLst>
-              <a:ext uri="{FF2B5EF4-FFF2-40B4-BE49-F238E27FC236}">
-                <a16:creationId xmlns:a16="http://schemas.microsoft.com/office/drawing/2014/main" id="{B0A23678-7B81-B148-9A72-455F7CCDD63E}"/>
-              </a:ext>
-            </a:extLst>
-          </p:cNvPr>
+          <p:cNvPr id="2" name="Title 1"/>
           <p:cNvSpPr>
             <a:spLocks noGrp="1"/>
           </p:cNvSpPr>
@@ -1506,8 +1329,8 @@
         </p:nvSpPr>
         <p:spPr>
           <a:xfrm>
-            <a:off x="839788" y="365125"/>
-            <a:ext cx="10515600" cy="1325563"/>
+            <a:off x="421534" y="345011"/>
+            <a:ext cx="5278339" cy="1252534"/>
           </a:xfrm>
         </p:spPr>
         <p:txBody>
@@ -1518,18 +1341,13 @@
               <a:rPr lang="en-US"/>
               <a:t>Click to edit Master title style</a:t>
             </a:r>
-          </a:p>
-        </p:txBody>
-      </p:sp>
-      <p:sp>
-        <p:nvSpPr>
-          <p:cNvPr id="3" name="Text Placeholder 2">
-            <a:extLst>
-              <a:ext uri="{FF2B5EF4-FFF2-40B4-BE49-F238E27FC236}">
-                <a16:creationId xmlns:a16="http://schemas.microsoft.com/office/drawing/2014/main" id="{DBE6CEA1-5CA6-B849-B2B1-FB5CA2951600}"/>
-              </a:ext>
-            </a:extLst>
-          </p:cNvPr>
+            <a:endParaRPr lang="en-US" dirty="0"/>
+          </a:p>
+        </p:txBody>
+      </p:sp>
+      <p:sp>
+        <p:nvSpPr>
+          <p:cNvPr id="3" name="Text Placeholder 2"/>
           <p:cNvSpPr>
             <a:spLocks noGrp="1"/>
           </p:cNvSpPr>
@@ -1539,8 +1357,8 @@
         </p:nvSpPr>
         <p:spPr>
           <a:xfrm>
-            <a:off x="839788" y="1681163"/>
-            <a:ext cx="5157787" cy="823912"/>
+            <a:off x="421535" y="1588543"/>
+            <a:ext cx="2588967" cy="778521"/>
           </a:xfrm>
         </p:spPr>
         <p:txBody>
@@ -1548,39 +1366,39 @@
           <a:lstStyle>
             <a:lvl1pPr marL="0" indent="0">
               <a:buNone/>
-              <a:defRPr sz="2400" b="1"/>
+              <a:defRPr sz="1606" b="1"/>
             </a:lvl1pPr>
-            <a:lvl2pPr marL="457200" indent="0">
+            <a:lvl2pPr marL="306004" indent="0">
               <a:buNone/>
-              <a:defRPr sz="2000" b="1"/>
+              <a:defRPr sz="1339" b="1"/>
             </a:lvl2pPr>
-            <a:lvl3pPr marL="914400" indent="0">
+            <a:lvl3pPr marL="612008" indent="0">
               <a:buNone/>
-              <a:defRPr sz="1800" b="1"/>
+              <a:defRPr sz="1205" b="1"/>
             </a:lvl3pPr>
-            <a:lvl4pPr marL="1371600" indent="0">
+            <a:lvl4pPr marL="918012" indent="0">
               <a:buNone/>
-              <a:defRPr sz="1600" b="1"/>
+              <a:defRPr sz="1071" b="1"/>
             </a:lvl4pPr>
-            <a:lvl5pPr marL="1828800" indent="0">
+            <a:lvl5pPr marL="1224016" indent="0">
               <a:buNone/>
-              <a:defRPr sz="1600" b="1"/>
+              <a:defRPr sz="1071" b="1"/>
             </a:lvl5pPr>
-            <a:lvl6pPr marL="2286000" indent="0">
+            <a:lvl6pPr marL="1530020" indent="0">
               <a:buNone/>
-              <a:defRPr sz="1600" b="1"/>
+              <a:defRPr sz="1071" b="1"/>
             </a:lvl6pPr>
-            <a:lvl7pPr marL="2743200" indent="0">
+            <a:lvl7pPr marL="1836024" indent="0">
               <a:buNone/>
-              <a:defRPr sz="1600" b="1"/>
+              <a:defRPr sz="1071" b="1"/>
             </a:lvl7pPr>
-            <a:lvl8pPr marL="3200400" indent="0">
+            <a:lvl8pPr marL="2142028" indent="0">
               <a:buNone/>
-              <a:defRPr sz="1600" b="1"/>
+              <a:defRPr sz="1071" b="1"/>
             </a:lvl8pPr>
-            <a:lvl9pPr marL="3657600" indent="0">
+            <a:lvl9pPr marL="2448032" indent="0">
               <a:buNone/>
-              <a:defRPr sz="1600" b="1"/>
+              <a:defRPr sz="1071" b="1"/>
             </a:lvl9pPr>
           </a:lstStyle>
           <a:p>
@@ -1594,13 +1412,7 @@
       </p:sp>
       <p:sp>
         <p:nvSpPr>
-          <p:cNvPr id="4" name="Content Placeholder 3">
-            <a:extLst>
-              <a:ext uri="{FF2B5EF4-FFF2-40B4-BE49-F238E27FC236}">
-                <a16:creationId xmlns:a16="http://schemas.microsoft.com/office/drawing/2014/main" id="{CCAD4575-B8C8-B444-A0DE-9626EFB857F9}"/>
-              </a:ext>
-            </a:extLst>
-          </p:cNvPr>
+          <p:cNvPr id="4" name="Content Placeholder 3"/>
           <p:cNvSpPr>
             <a:spLocks noGrp="1"/>
           </p:cNvSpPr>
@@ -1610,8 +1422,8 @@
         </p:nvSpPr>
         <p:spPr>
           <a:xfrm>
-            <a:off x="839788" y="2505075"/>
-            <a:ext cx="5157787" cy="3684588"/>
+            <a:off x="421535" y="2367064"/>
+            <a:ext cx="2588967" cy="3481594"/>
           </a:xfrm>
         </p:spPr>
         <p:txBody>
@@ -1651,18 +1463,13 @@
               <a:rPr lang="en-US"/>
               <a:t>Fifth level</a:t>
             </a:r>
-          </a:p>
-        </p:txBody>
-      </p:sp>
-      <p:sp>
-        <p:nvSpPr>
-          <p:cNvPr id="5" name="Text Placeholder 4">
-            <a:extLst>
-              <a:ext uri="{FF2B5EF4-FFF2-40B4-BE49-F238E27FC236}">
-                <a16:creationId xmlns:a16="http://schemas.microsoft.com/office/drawing/2014/main" id="{E27FCCD1-15BB-8240-BB8F-B07971766254}"/>
-              </a:ext>
-            </a:extLst>
-          </p:cNvPr>
+            <a:endParaRPr lang="en-US" dirty="0"/>
+          </a:p>
+        </p:txBody>
+      </p:sp>
+      <p:sp>
+        <p:nvSpPr>
+          <p:cNvPr id="5" name="Text Placeholder 4"/>
           <p:cNvSpPr>
             <a:spLocks noGrp="1"/>
           </p:cNvSpPr>
@@ -1672,8 +1479,8 @@
         </p:nvSpPr>
         <p:spPr>
           <a:xfrm>
-            <a:off x="6172200" y="1681163"/>
-            <a:ext cx="5183188" cy="823912"/>
+            <a:off x="3098155" y="1588543"/>
+            <a:ext cx="2601718" cy="778521"/>
           </a:xfrm>
         </p:spPr>
         <p:txBody>
@@ -1681,39 +1488,39 @@
           <a:lstStyle>
             <a:lvl1pPr marL="0" indent="0">
               <a:buNone/>
-              <a:defRPr sz="2400" b="1"/>
+              <a:defRPr sz="1606" b="1"/>
             </a:lvl1pPr>
-            <a:lvl2pPr marL="457200" indent="0">
+            <a:lvl2pPr marL="306004" indent="0">
               <a:buNone/>
-              <a:defRPr sz="2000" b="1"/>
+              <a:defRPr sz="1339" b="1"/>
             </a:lvl2pPr>
-            <a:lvl3pPr marL="914400" indent="0">
+            <a:lvl3pPr marL="612008" indent="0">
               <a:buNone/>
-              <a:defRPr sz="1800" b="1"/>
+              <a:defRPr sz="1205" b="1"/>
             </a:lvl3pPr>
-            <a:lvl4pPr marL="1371600" indent="0">
+            <a:lvl4pPr marL="918012" indent="0">
               <a:buNone/>
-              <a:defRPr sz="1600" b="1"/>
+              <a:defRPr sz="1071" b="1"/>
             </a:lvl4pPr>
-            <a:lvl5pPr marL="1828800" indent="0">
+            <a:lvl5pPr marL="1224016" indent="0">
               <a:buNone/>
-              <a:defRPr sz="1600" b="1"/>
+              <a:defRPr sz="1071" b="1"/>
             </a:lvl5pPr>
-            <a:lvl6pPr marL="2286000" indent="0">
+            <a:lvl6pPr marL="1530020" indent="0">
               <a:buNone/>
-              <a:defRPr sz="1600" b="1"/>
+              <a:defRPr sz="1071" b="1"/>
             </a:lvl6pPr>
-            <a:lvl7pPr marL="2743200" indent="0">
+            <a:lvl7pPr marL="1836024" indent="0">
               <a:buNone/>
-              <a:defRPr sz="1600" b="1"/>
+              <a:defRPr sz="1071" b="1"/>
             </a:lvl7pPr>
-            <a:lvl8pPr marL="3200400" indent="0">
+            <a:lvl8pPr marL="2142028" indent="0">
               <a:buNone/>
-              <a:defRPr sz="1600" b="1"/>
+              <a:defRPr sz="1071" b="1"/>
             </a:lvl8pPr>
-            <a:lvl9pPr marL="3657600" indent="0">
+            <a:lvl9pPr marL="2448032" indent="0">
               <a:buNone/>
-              <a:defRPr sz="1600" b="1"/>
+              <a:defRPr sz="1071" b="1"/>
             </a:lvl9pPr>
           </a:lstStyle>
           <a:p>
@@ -1727,13 +1534,7 @@
       </p:sp>
       <p:sp>
         <p:nvSpPr>
-          <p:cNvPr id="6" name="Content Placeholder 5">
-            <a:extLst>
-              <a:ext uri="{FF2B5EF4-FFF2-40B4-BE49-F238E27FC236}">
-                <a16:creationId xmlns:a16="http://schemas.microsoft.com/office/drawing/2014/main" id="{DA12F9A7-DD36-094D-80E2-2FA3C2976828}"/>
-              </a:ext>
-            </a:extLst>
-          </p:cNvPr>
+          <p:cNvPr id="6" name="Content Placeholder 5"/>
           <p:cNvSpPr>
             <a:spLocks noGrp="1"/>
           </p:cNvSpPr>
@@ -1743,8 +1544,8 @@
         </p:nvSpPr>
         <p:spPr>
           <a:xfrm>
-            <a:off x="6172200" y="2505075"/>
-            <a:ext cx="5183188" cy="3684588"/>
+            <a:off x="3098155" y="2367064"/>
+            <a:ext cx="2601718" cy="3481594"/>
           </a:xfrm>
         </p:spPr>
         <p:txBody>
@@ -1784,18 +1585,13 @@
               <a:rPr lang="en-US"/>
               <a:t>Fifth level</a:t>
             </a:r>
-          </a:p>
-        </p:txBody>
-      </p:sp>
-      <p:sp>
-        <p:nvSpPr>
-          <p:cNvPr id="7" name="Date Placeholder 6">
-            <a:extLst>
-              <a:ext uri="{FF2B5EF4-FFF2-40B4-BE49-F238E27FC236}">
-                <a16:creationId xmlns:a16="http://schemas.microsoft.com/office/drawing/2014/main" id="{77A01F08-CB26-4549-82AD-CD64C99C572F}"/>
-              </a:ext>
-            </a:extLst>
-          </p:cNvPr>
+            <a:endParaRPr lang="en-US" dirty="0"/>
+          </a:p>
+        </p:txBody>
+      </p:sp>
+      <p:sp>
+        <p:nvSpPr>
+          <p:cNvPr id="7" name="Date Placeholder 6"/>
           <p:cNvSpPr>
             <a:spLocks noGrp="1"/>
           </p:cNvSpPr>
@@ -1810,7 +1606,7 @@
           <a:p>
             <a:fld id="{2412A0D1-1243-3144-AEF2-A5C0AB2FFF96}" type="datetimeFigureOut">
               <a:rPr lang="en-US" smtClean="0"/>
-              <a:t>9/10/19</a:t>
+              <a:t>9/12/19</a:t>
             </a:fld>
             <a:endParaRPr lang="en-US"/>
           </a:p>
@@ -1818,13 +1614,7 @@
       </p:sp>
       <p:sp>
         <p:nvSpPr>
-          <p:cNvPr id="8" name="Footer Placeholder 7">
-            <a:extLst>
-              <a:ext uri="{FF2B5EF4-FFF2-40B4-BE49-F238E27FC236}">
-                <a16:creationId xmlns:a16="http://schemas.microsoft.com/office/drawing/2014/main" id="{3D6EC1C7-6398-164A-B569-F1F1C4862D89}"/>
-              </a:ext>
-            </a:extLst>
-          </p:cNvPr>
+          <p:cNvPr id="8" name="Footer Placeholder 7"/>
           <p:cNvSpPr>
             <a:spLocks noGrp="1"/>
           </p:cNvSpPr>
@@ -1843,13 +1633,7 @@
       </p:sp>
       <p:sp>
         <p:nvSpPr>
-          <p:cNvPr id="9" name="Slide Number Placeholder 8">
-            <a:extLst>
-              <a:ext uri="{FF2B5EF4-FFF2-40B4-BE49-F238E27FC236}">
-                <a16:creationId xmlns:a16="http://schemas.microsoft.com/office/drawing/2014/main" id="{C9381C73-FF28-4548-8842-FFAAFDFC5D38}"/>
-              </a:ext>
-            </a:extLst>
-          </p:cNvPr>
+          <p:cNvPr id="9" name="Slide Number Placeholder 8"/>
           <p:cNvSpPr>
             <a:spLocks noGrp="1"/>
           </p:cNvSpPr>
@@ -1873,7 +1657,7 @@
     </p:spTree>
     <p:extLst>
       <p:ext uri="{BB962C8B-B14F-4D97-AF65-F5344CB8AC3E}">
-        <p14:creationId xmlns:p14="http://schemas.microsoft.com/office/powerpoint/2010/main" val="1826963294"/>
+        <p14:creationId xmlns:p14="http://schemas.microsoft.com/office/powerpoint/2010/main" val="2503326798"/>
       </p:ext>
     </p:extLst>
   </p:cSld>
@@ -1902,13 +1686,7 @@
       </p:grpSpPr>
       <p:sp>
         <p:nvSpPr>
-          <p:cNvPr id="2" name="Title 1">
-            <a:extLst>
-              <a:ext uri="{FF2B5EF4-FFF2-40B4-BE49-F238E27FC236}">
-                <a16:creationId xmlns:a16="http://schemas.microsoft.com/office/drawing/2014/main" id="{77E08BCB-9426-B449-B04E-E4BF01A8B23E}"/>
-              </a:ext>
-            </a:extLst>
-          </p:cNvPr>
+          <p:cNvPr id="2" name="Title 1"/>
           <p:cNvSpPr>
             <a:spLocks noGrp="1"/>
           </p:cNvSpPr>
@@ -1925,18 +1703,13 @@
               <a:rPr lang="en-US"/>
               <a:t>Click to edit Master title style</a:t>
             </a:r>
-          </a:p>
-        </p:txBody>
-      </p:sp>
-      <p:sp>
-        <p:nvSpPr>
-          <p:cNvPr id="3" name="Date Placeholder 2">
-            <a:extLst>
-              <a:ext uri="{FF2B5EF4-FFF2-40B4-BE49-F238E27FC236}">
-                <a16:creationId xmlns:a16="http://schemas.microsoft.com/office/drawing/2014/main" id="{D7CAD2BE-9810-A846-AEBD-3FA0D0856630}"/>
-              </a:ext>
-            </a:extLst>
-          </p:cNvPr>
+            <a:endParaRPr lang="en-US" dirty="0"/>
+          </a:p>
+        </p:txBody>
+      </p:sp>
+      <p:sp>
+        <p:nvSpPr>
+          <p:cNvPr id="3" name="Date Placeholder 2"/>
           <p:cNvSpPr>
             <a:spLocks noGrp="1"/>
           </p:cNvSpPr>
@@ -1951,7 +1724,7 @@
           <a:p>
             <a:fld id="{2412A0D1-1243-3144-AEF2-A5C0AB2FFF96}" type="datetimeFigureOut">
               <a:rPr lang="en-US" smtClean="0"/>
-              <a:t>9/10/19</a:t>
+              <a:t>9/12/19</a:t>
             </a:fld>
             <a:endParaRPr lang="en-US"/>
           </a:p>
@@ -1959,13 +1732,7 @@
       </p:sp>
       <p:sp>
         <p:nvSpPr>
-          <p:cNvPr id="4" name="Footer Placeholder 3">
-            <a:extLst>
-              <a:ext uri="{FF2B5EF4-FFF2-40B4-BE49-F238E27FC236}">
-                <a16:creationId xmlns:a16="http://schemas.microsoft.com/office/drawing/2014/main" id="{0AE335EE-1D83-6941-8D93-092F3F9DD7E8}"/>
-              </a:ext>
-            </a:extLst>
-          </p:cNvPr>
+          <p:cNvPr id="4" name="Footer Placeholder 3"/>
           <p:cNvSpPr>
             <a:spLocks noGrp="1"/>
           </p:cNvSpPr>
@@ -1984,13 +1751,7 @@
       </p:sp>
       <p:sp>
         <p:nvSpPr>
-          <p:cNvPr id="5" name="Slide Number Placeholder 4">
-            <a:extLst>
-              <a:ext uri="{FF2B5EF4-FFF2-40B4-BE49-F238E27FC236}">
-                <a16:creationId xmlns:a16="http://schemas.microsoft.com/office/drawing/2014/main" id="{AE893C16-0B1C-EE46-AB3D-4DFE9D1BBBBF}"/>
-              </a:ext>
-            </a:extLst>
-          </p:cNvPr>
+          <p:cNvPr id="5" name="Slide Number Placeholder 4"/>
           <p:cNvSpPr>
             <a:spLocks noGrp="1"/>
           </p:cNvSpPr>
@@ -2014,7 +1775,7 @@
     </p:spTree>
     <p:extLst>
       <p:ext uri="{BB962C8B-B14F-4D97-AF65-F5344CB8AC3E}">
-        <p14:creationId xmlns:p14="http://schemas.microsoft.com/office/powerpoint/2010/main" val="3798491341"/>
+        <p14:creationId xmlns:p14="http://schemas.microsoft.com/office/powerpoint/2010/main" val="4272186515"/>
       </p:ext>
     </p:extLst>
   </p:cSld>
@@ -2043,13 +1804,7 @@
       </p:grpSpPr>
       <p:sp>
         <p:nvSpPr>
-          <p:cNvPr id="2" name="Date Placeholder 1">
-            <a:extLst>
-              <a:ext uri="{FF2B5EF4-FFF2-40B4-BE49-F238E27FC236}">
-                <a16:creationId xmlns:a16="http://schemas.microsoft.com/office/drawing/2014/main" id="{FFB0B8C7-40FE-0F44-842C-75CCF839A050}"/>
-              </a:ext>
-            </a:extLst>
-          </p:cNvPr>
+          <p:cNvPr id="2" name="Date Placeholder 1"/>
           <p:cNvSpPr>
             <a:spLocks noGrp="1"/>
           </p:cNvSpPr>
@@ -2064,7 +1819,7 @@
           <a:p>
             <a:fld id="{2412A0D1-1243-3144-AEF2-A5C0AB2FFF96}" type="datetimeFigureOut">
               <a:rPr lang="en-US" smtClean="0"/>
-              <a:t>9/10/19</a:t>
+              <a:t>9/12/19</a:t>
             </a:fld>
             <a:endParaRPr lang="en-US"/>
           </a:p>
@@ -2072,13 +1827,7 @@
       </p:sp>
       <p:sp>
         <p:nvSpPr>
-          <p:cNvPr id="3" name="Footer Placeholder 2">
-            <a:extLst>
-              <a:ext uri="{FF2B5EF4-FFF2-40B4-BE49-F238E27FC236}">
-                <a16:creationId xmlns:a16="http://schemas.microsoft.com/office/drawing/2014/main" id="{A73E4429-8CFE-934F-9373-3C315EDCF530}"/>
-              </a:ext>
-            </a:extLst>
-          </p:cNvPr>
+          <p:cNvPr id="3" name="Footer Placeholder 2"/>
           <p:cNvSpPr>
             <a:spLocks noGrp="1"/>
           </p:cNvSpPr>
@@ -2097,13 +1846,7 @@
       </p:sp>
       <p:sp>
         <p:nvSpPr>
-          <p:cNvPr id="4" name="Slide Number Placeholder 3">
-            <a:extLst>
-              <a:ext uri="{FF2B5EF4-FFF2-40B4-BE49-F238E27FC236}">
-                <a16:creationId xmlns:a16="http://schemas.microsoft.com/office/drawing/2014/main" id="{0A8CCECD-DACA-2248-9100-8A173D0D5453}"/>
-              </a:ext>
-            </a:extLst>
-          </p:cNvPr>
+          <p:cNvPr id="4" name="Slide Number Placeholder 3"/>
           <p:cNvSpPr>
             <a:spLocks noGrp="1"/>
           </p:cNvSpPr>
@@ -2127,7 +1870,7 @@
     </p:spTree>
     <p:extLst>
       <p:ext uri="{BB962C8B-B14F-4D97-AF65-F5344CB8AC3E}">
-        <p14:creationId xmlns:p14="http://schemas.microsoft.com/office/powerpoint/2010/main" val="88679256"/>
+        <p14:creationId xmlns:p14="http://schemas.microsoft.com/office/powerpoint/2010/main" val="1015162499"/>
       </p:ext>
     </p:extLst>
   </p:cSld>
@@ -2156,13 +1899,7 @@
       </p:grpSpPr>
       <p:sp>
         <p:nvSpPr>
-          <p:cNvPr id="2" name="Title 1">
-            <a:extLst>
-              <a:ext uri="{FF2B5EF4-FFF2-40B4-BE49-F238E27FC236}">
-                <a16:creationId xmlns:a16="http://schemas.microsoft.com/office/drawing/2014/main" id="{189990B0-5261-3344-B828-95492354E7DD}"/>
-              </a:ext>
-            </a:extLst>
-          </p:cNvPr>
+          <p:cNvPr id="2" name="Title 1"/>
           <p:cNvSpPr>
             <a:spLocks noGrp="1"/>
           </p:cNvSpPr>
@@ -2172,15 +1909,15 @@
         </p:nvSpPr>
         <p:spPr>
           <a:xfrm>
-            <a:off x="839788" y="457200"/>
-            <a:ext cx="3932237" cy="1600200"/>
+            <a:off x="421534" y="432012"/>
+            <a:ext cx="1973799" cy="1512041"/>
           </a:xfrm>
         </p:spPr>
         <p:txBody>
           <a:bodyPr anchor="b"/>
           <a:lstStyle>
             <a:lvl1pPr>
-              <a:defRPr sz="3200"/>
+              <a:defRPr sz="2142"/>
             </a:lvl1pPr>
           </a:lstStyle>
           <a:p>
@@ -2188,18 +1925,13 @@
               <a:rPr lang="en-US"/>
               <a:t>Click to edit Master title style</a:t>
             </a:r>
-          </a:p>
-        </p:txBody>
-      </p:sp>
-      <p:sp>
-        <p:nvSpPr>
-          <p:cNvPr id="3" name="Content Placeholder 2">
-            <a:extLst>
-              <a:ext uri="{FF2B5EF4-FFF2-40B4-BE49-F238E27FC236}">
-                <a16:creationId xmlns:a16="http://schemas.microsoft.com/office/drawing/2014/main" id="{7DFE390A-D395-7544-9B61-033807816738}"/>
-              </a:ext>
-            </a:extLst>
-          </p:cNvPr>
+            <a:endParaRPr lang="en-US" dirty="0"/>
+          </a:p>
+        </p:txBody>
+      </p:sp>
+      <p:sp>
+        <p:nvSpPr>
+          <p:cNvPr id="3" name="Content Placeholder 2"/>
           <p:cNvSpPr>
             <a:spLocks noGrp="1"/>
           </p:cNvSpPr>
@@ -2209,39 +1941,39 @@
         </p:nvSpPr>
         <p:spPr>
           <a:xfrm>
-            <a:off x="5183188" y="987425"/>
-            <a:ext cx="6172200" cy="4873625"/>
+            <a:off x="2601718" y="933027"/>
+            <a:ext cx="3098155" cy="4605124"/>
           </a:xfrm>
         </p:spPr>
         <p:txBody>
           <a:bodyPr/>
           <a:lstStyle>
             <a:lvl1pPr>
-              <a:defRPr sz="3200"/>
+              <a:defRPr sz="2142"/>
             </a:lvl1pPr>
             <a:lvl2pPr>
-              <a:defRPr sz="2800"/>
+              <a:defRPr sz="1874"/>
             </a:lvl2pPr>
             <a:lvl3pPr>
-              <a:defRPr sz="2400"/>
+              <a:defRPr sz="1606"/>
             </a:lvl3pPr>
             <a:lvl4pPr>
-              <a:defRPr sz="2000"/>
+              <a:defRPr sz="1339"/>
             </a:lvl4pPr>
             <a:lvl5pPr>
-              <a:defRPr sz="2000"/>
+              <a:defRPr sz="1339"/>
             </a:lvl5pPr>
             <a:lvl6pPr>
-              <a:defRPr sz="2000"/>
+              <a:defRPr sz="1339"/>
             </a:lvl6pPr>
             <a:lvl7pPr>
-              <a:defRPr sz="2000"/>
+              <a:defRPr sz="1339"/>
             </a:lvl7pPr>
             <a:lvl8pPr>
-              <a:defRPr sz="2000"/>
+              <a:defRPr sz="1339"/>
             </a:lvl8pPr>
             <a:lvl9pPr>
-              <a:defRPr sz="2000"/>
+              <a:defRPr sz="1339"/>
             </a:lvl9pPr>
           </a:lstStyle>
           <a:p>
@@ -2278,18 +2010,13 @@
               <a:rPr lang="en-US"/>
               <a:t>Fifth level</a:t>
             </a:r>
-          </a:p>
-        </p:txBody>
-      </p:sp>
-      <p:sp>
-        <p:nvSpPr>
-          <p:cNvPr id="4" name="Text Placeholder 3">
-            <a:extLst>
-              <a:ext uri="{FF2B5EF4-FFF2-40B4-BE49-F238E27FC236}">
-                <a16:creationId xmlns:a16="http://schemas.microsoft.com/office/drawing/2014/main" id="{AF2BCEB9-DF0B-DF40-BD4E-9085EA12FECA}"/>
-              </a:ext>
-            </a:extLst>
-          </p:cNvPr>
+            <a:endParaRPr lang="en-US" dirty="0"/>
+          </a:p>
+        </p:txBody>
+      </p:sp>
+      <p:sp>
+        <p:nvSpPr>
+          <p:cNvPr id="4" name="Text Placeholder 3"/>
           <p:cNvSpPr>
             <a:spLocks noGrp="1"/>
           </p:cNvSpPr>
@@ -2299,8 +2026,8 @@
         </p:nvSpPr>
         <p:spPr>
           <a:xfrm>
-            <a:off x="839788" y="2057400"/>
-            <a:ext cx="3932237" cy="3811588"/>
+            <a:off x="421534" y="1944052"/>
+            <a:ext cx="1973799" cy="3601598"/>
           </a:xfrm>
         </p:spPr>
         <p:txBody>
@@ -2308,39 +2035,39 @@
           <a:lstStyle>
             <a:lvl1pPr marL="0" indent="0">
               <a:buNone/>
-              <a:defRPr sz="1600"/>
+              <a:defRPr sz="1071"/>
             </a:lvl1pPr>
-            <a:lvl2pPr marL="457200" indent="0">
+            <a:lvl2pPr marL="306004" indent="0">
               <a:buNone/>
-              <a:defRPr sz="1400"/>
+              <a:defRPr sz="937"/>
             </a:lvl2pPr>
-            <a:lvl3pPr marL="914400" indent="0">
+            <a:lvl3pPr marL="612008" indent="0">
               <a:buNone/>
-              <a:defRPr sz="1200"/>
+              <a:defRPr sz="803"/>
             </a:lvl3pPr>
-            <a:lvl4pPr marL="1371600" indent="0">
+            <a:lvl4pPr marL="918012" indent="0">
               <a:buNone/>
-              <a:defRPr sz="1000"/>
+              <a:defRPr sz="669"/>
             </a:lvl4pPr>
-            <a:lvl5pPr marL="1828800" indent="0">
+            <a:lvl5pPr marL="1224016" indent="0">
               <a:buNone/>
-              <a:defRPr sz="1000"/>
+              <a:defRPr sz="669"/>
             </a:lvl5pPr>
-            <a:lvl6pPr marL="2286000" indent="0">
+            <a:lvl6pPr marL="1530020" indent="0">
               <a:buNone/>
-              <a:defRPr sz="1000"/>
+              <a:defRPr sz="669"/>
             </a:lvl6pPr>
-            <a:lvl7pPr marL="2743200" indent="0">
+            <a:lvl7pPr marL="1836024" indent="0">
               <a:buNone/>
-              <a:defRPr sz="1000"/>
+              <a:defRPr sz="669"/>
             </a:lvl7pPr>
-            <a:lvl8pPr marL="3200400" indent="0">
+            <a:lvl8pPr marL="2142028" indent="0">
               <a:buNone/>
-              <a:defRPr sz="1000"/>
+              <a:defRPr sz="669"/>
             </a:lvl8pPr>
-            <a:lvl9pPr marL="3657600" indent="0">
+            <a:lvl9pPr marL="2448032" indent="0">
               <a:buNone/>
-              <a:defRPr sz="1000"/>
+              <a:defRPr sz="669"/>
             </a:lvl9pPr>
           </a:lstStyle>
           <a:p>
@@ -2354,13 +2081,7 @@
       </p:sp>
       <p:sp>
         <p:nvSpPr>
-          <p:cNvPr id="5" name="Date Placeholder 4">
-            <a:extLst>
-              <a:ext uri="{FF2B5EF4-FFF2-40B4-BE49-F238E27FC236}">
-                <a16:creationId xmlns:a16="http://schemas.microsoft.com/office/drawing/2014/main" id="{63F21FD0-BD98-A346-A629-D3D4D33A2CB0}"/>
-              </a:ext>
-            </a:extLst>
-          </p:cNvPr>
+          <p:cNvPr id="5" name="Date Placeholder 4"/>
           <p:cNvSpPr>
             <a:spLocks noGrp="1"/>
           </p:cNvSpPr>
@@ -2375,7 +2096,7 @@
           <a:p>
             <a:fld id="{2412A0D1-1243-3144-AEF2-A5C0AB2FFF96}" type="datetimeFigureOut">
               <a:rPr lang="en-US" smtClean="0"/>
-              <a:t>9/10/19</a:t>
+              <a:t>9/12/19</a:t>
             </a:fld>
             <a:endParaRPr lang="en-US"/>
           </a:p>
@@ -2383,13 +2104,7 @@
       </p:sp>
       <p:sp>
         <p:nvSpPr>
-          <p:cNvPr id="6" name="Footer Placeholder 5">
-            <a:extLst>
-              <a:ext uri="{FF2B5EF4-FFF2-40B4-BE49-F238E27FC236}">
-                <a16:creationId xmlns:a16="http://schemas.microsoft.com/office/drawing/2014/main" id="{6720FBA2-27F9-CD40-9B0E-858F491AE357}"/>
-              </a:ext>
-            </a:extLst>
-          </p:cNvPr>
+          <p:cNvPr id="6" name="Footer Placeholder 5"/>
           <p:cNvSpPr>
             <a:spLocks noGrp="1"/>
           </p:cNvSpPr>
@@ -2408,13 +2123,7 @@
       </p:sp>
       <p:sp>
         <p:nvSpPr>
-          <p:cNvPr id="7" name="Slide Number Placeholder 6">
-            <a:extLst>
-              <a:ext uri="{FF2B5EF4-FFF2-40B4-BE49-F238E27FC236}">
-                <a16:creationId xmlns:a16="http://schemas.microsoft.com/office/drawing/2014/main" id="{670CD69C-019A-E846-A039-CEADD4AE75D5}"/>
-              </a:ext>
-            </a:extLst>
-          </p:cNvPr>
+          <p:cNvPr id="7" name="Slide Number Placeholder 6"/>
           <p:cNvSpPr>
             <a:spLocks noGrp="1"/>
           </p:cNvSpPr>
@@ -2438,7 +2147,7 @@
     </p:spTree>
     <p:extLst>
       <p:ext uri="{BB962C8B-B14F-4D97-AF65-F5344CB8AC3E}">
-        <p14:creationId xmlns:p14="http://schemas.microsoft.com/office/powerpoint/2010/main" val="975232347"/>
+        <p14:creationId xmlns:p14="http://schemas.microsoft.com/office/powerpoint/2010/main" val="2693348425"/>
       </p:ext>
     </p:extLst>
   </p:cSld>
@@ -2467,13 +2176,7 @@
       </p:grpSpPr>
       <p:sp>
         <p:nvSpPr>
-          <p:cNvPr id="2" name="Title 1">
-            <a:extLst>
-              <a:ext uri="{FF2B5EF4-FFF2-40B4-BE49-F238E27FC236}">
-                <a16:creationId xmlns:a16="http://schemas.microsoft.com/office/drawing/2014/main" id="{A1A9B8EE-8925-0F44-84C6-D89DD8F679D6}"/>
-              </a:ext>
-            </a:extLst>
-          </p:cNvPr>
+          <p:cNvPr id="2" name="Title 1"/>
           <p:cNvSpPr>
             <a:spLocks noGrp="1"/>
           </p:cNvSpPr>
@@ -2483,15 +2186,15 @@
         </p:nvSpPr>
         <p:spPr>
           <a:xfrm>
-            <a:off x="839788" y="457200"/>
-            <a:ext cx="3932237" cy="1600200"/>
+            <a:off x="421534" y="432012"/>
+            <a:ext cx="1973799" cy="1512041"/>
           </a:xfrm>
         </p:spPr>
         <p:txBody>
           <a:bodyPr anchor="b"/>
           <a:lstStyle>
             <a:lvl1pPr>
-              <a:defRPr sz="3200"/>
+              <a:defRPr sz="2142"/>
             </a:lvl1pPr>
           </a:lstStyle>
           <a:p>
@@ -2499,20 +2202,15 @@
               <a:rPr lang="en-US"/>
               <a:t>Click to edit Master title style</a:t>
             </a:r>
-          </a:p>
-        </p:txBody>
-      </p:sp>
-      <p:sp>
-        <p:nvSpPr>
-          <p:cNvPr id="3" name="Picture Placeholder 2">
-            <a:extLst>
-              <a:ext uri="{FF2B5EF4-FFF2-40B4-BE49-F238E27FC236}">
-                <a16:creationId xmlns:a16="http://schemas.microsoft.com/office/drawing/2014/main" id="{53E3F5A4-C2A5-5E4E-86CC-8114A87DC461}"/>
-              </a:ext>
-            </a:extLst>
-          </p:cNvPr>
+            <a:endParaRPr lang="en-US" dirty="0"/>
+          </a:p>
+        </p:txBody>
+      </p:sp>
+      <p:sp>
+        <p:nvSpPr>
+          <p:cNvPr id="3" name="Picture Placeholder 2"/>
           <p:cNvSpPr>
-            <a:spLocks noGrp="1"/>
+            <a:spLocks noGrp="1" noChangeAspect="1"/>
           </p:cNvSpPr>
           <p:nvPr>
             <p:ph type="pic" idx="1"/>
@@ -2520,64 +2218,62 @@
         </p:nvSpPr>
         <p:spPr>
           <a:xfrm>
-            <a:off x="5183188" y="987425"/>
-            <a:ext cx="6172200" cy="4873625"/>
-          </a:xfrm>
-        </p:spPr>
-        <p:txBody>
-          <a:bodyPr/>
+            <a:off x="2601718" y="933027"/>
+            <a:ext cx="3098155" cy="4605124"/>
+          </a:xfrm>
+        </p:spPr>
+        <p:txBody>
+          <a:bodyPr anchor="t"/>
           <a:lstStyle>
             <a:lvl1pPr marL="0" indent="0">
               <a:buNone/>
-              <a:defRPr sz="3200"/>
+              <a:defRPr sz="2142"/>
             </a:lvl1pPr>
-            <a:lvl2pPr marL="457200" indent="0">
+            <a:lvl2pPr marL="306004" indent="0">
               <a:buNone/>
-              <a:defRPr sz="2800"/>
+              <a:defRPr sz="1874"/>
             </a:lvl2pPr>
-            <a:lvl3pPr marL="914400" indent="0">
+            <a:lvl3pPr marL="612008" indent="0">
               <a:buNone/>
-              <a:defRPr sz="2400"/>
+              <a:defRPr sz="1606"/>
             </a:lvl3pPr>
-            <a:lvl4pPr marL="1371600" indent="0">
+            <a:lvl4pPr marL="918012" indent="0">
               <a:buNone/>
-              <a:defRPr sz="2000"/>
+              <a:defRPr sz="1339"/>
             </a:lvl4pPr>
-            <a:lvl5pPr marL="1828800" indent="0">
+            <a:lvl5pPr marL="1224016" indent="0">
               <a:buNone/>
-              <a:defRPr sz="2000"/>
+              <a:defRPr sz="1339"/>
             </a:lvl5pPr>
-            <a:lvl6pPr marL="2286000" indent="0">
+            <a:lvl6pPr marL="1530020" indent="0">
               <a:buNone/>
-              <a:defRPr sz="2000"/>
+              <a:defRPr sz="1339"/>
             </a:lvl6pPr>
-            <a:lvl7pPr marL="2743200" indent="0">
+            <a:lvl7pPr marL="1836024" indent="0">
               <a:buNone/>
-              <a:defRPr sz="2000"/>
+              <a:defRPr sz="1339"/>
             </a:lvl7pPr>
-            <a:lvl8pPr marL="3200400" indent="0">
+            <a:lvl8pPr marL="2142028" indent="0">
               <a:buNone/>
-              <a:defRPr sz="2000"/>
+              <a:defRPr sz="1339"/>
             </a:lvl8pPr>
-            <a:lvl9pPr marL="3657600" indent="0">
+            <a:lvl9pPr marL="2448032" indent="0">
               <a:buNone/>
-              <a:defRPr sz="2000"/>
+              <a:defRPr sz="1339"/>
             </a:lvl9pPr>
           </a:lstStyle>
           <a:p>
-            <a:endParaRPr lang="en-US"/>
-          </a:p>
-        </p:txBody>
-      </p:sp>
-      <p:sp>
-        <p:nvSpPr>
-          <p:cNvPr id="4" name="Text Placeholder 3">
-            <a:extLst>
-              <a:ext uri="{FF2B5EF4-FFF2-40B4-BE49-F238E27FC236}">
-                <a16:creationId xmlns:a16="http://schemas.microsoft.com/office/drawing/2014/main" id="{EE3B6866-1A3F-8247-9E2B-630E14861638}"/>
-              </a:ext>
-            </a:extLst>
-          </p:cNvPr>
+            <a:r>
+              <a:rPr lang="en-US"/>
+              <a:t>Click icon to add picture</a:t>
+            </a:r>
+            <a:endParaRPr lang="en-US" dirty="0"/>
+          </a:p>
+        </p:txBody>
+      </p:sp>
+      <p:sp>
+        <p:nvSpPr>
+          <p:cNvPr id="4" name="Text Placeholder 3"/>
           <p:cNvSpPr>
             <a:spLocks noGrp="1"/>
           </p:cNvSpPr>
@@ -2587,8 +2283,8 @@
         </p:nvSpPr>
         <p:spPr>
           <a:xfrm>
-            <a:off x="839788" y="2057400"/>
-            <a:ext cx="3932237" cy="3811588"/>
+            <a:off x="421534" y="1944052"/>
+            <a:ext cx="1973799" cy="3601598"/>
           </a:xfrm>
         </p:spPr>
         <p:txBody>
@@ -2596,39 +2292,39 @@
           <a:lstStyle>
             <a:lvl1pPr marL="0" indent="0">
               <a:buNone/>
-              <a:defRPr sz="1600"/>
+              <a:defRPr sz="1071"/>
             </a:lvl1pPr>
-            <a:lvl2pPr marL="457200" indent="0">
+            <a:lvl2pPr marL="306004" indent="0">
               <a:buNone/>
-              <a:defRPr sz="1400"/>
+              <a:defRPr sz="937"/>
             </a:lvl2pPr>
-            <a:lvl3pPr marL="914400" indent="0">
+            <a:lvl3pPr marL="612008" indent="0">
               <a:buNone/>
-              <a:defRPr sz="1200"/>
+              <a:defRPr sz="803"/>
             </a:lvl3pPr>
-            <a:lvl4pPr marL="1371600" indent="0">
+            <a:lvl4pPr marL="918012" indent="0">
               <a:buNone/>
-              <a:defRPr sz="1000"/>
+              <a:defRPr sz="669"/>
             </a:lvl4pPr>
-            <a:lvl5pPr marL="1828800" indent="0">
+            <a:lvl5pPr marL="1224016" indent="0">
               <a:buNone/>
-              <a:defRPr sz="1000"/>
+              <a:defRPr sz="669"/>
             </a:lvl5pPr>
-            <a:lvl6pPr marL="2286000" indent="0">
+            <a:lvl6pPr marL="1530020" indent="0">
               <a:buNone/>
-              <a:defRPr sz="1000"/>
+              <a:defRPr sz="669"/>
             </a:lvl6pPr>
-            <a:lvl7pPr marL="2743200" indent="0">
+            <a:lvl7pPr marL="1836024" indent="0">
               <a:buNone/>
-              <a:defRPr sz="1000"/>
+              <a:defRPr sz="669"/>
             </a:lvl7pPr>
-            <a:lvl8pPr marL="3200400" indent="0">
+            <a:lvl8pPr marL="2142028" indent="0">
               <a:buNone/>
-              <a:defRPr sz="1000"/>
+              <a:defRPr sz="669"/>
             </a:lvl8pPr>
-            <a:lvl9pPr marL="3657600" indent="0">
+            <a:lvl9pPr marL="2448032" indent="0">
               <a:buNone/>
-              <a:defRPr sz="1000"/>
+              <a:defRPr sz="669"/>
             </a:lvl9pPr>
           </a:lstStyle>
           <a:p>
@@ -2642,13 +2338,7 @@
       </p:sp>
       <p:sp>
         <p:nvSpPr>
-          <p:cNvPr id="5" name="Date Placeholder 4">
-            <a:extLst>
-              <a:ext uri="{FF2B5EF4-FFF2-40B4-BE49-F238E27FC236}">
-                <a16:creationId xmlns:a16="http://schemas.microsoft.com/office/drawing/2014/main" id="{A72DEC7B-AA57-1141-B0D0-BD165526F2DA}"/>
-              </a:ext>
-            </a:extLst>
-          </p:cNvPr>
+          <p:cNvPr id="5" name="Date Placeholder 4"/>
           <p:cNvSpPr>
             <a:spLocks noGrp="1"/>
           </p:cNvSpPr>
@@ -2663,7 +2353,7 @@
           <a:p>
             <a:fld id="{2412A0D1-1243-3144-AEF2-A5C0AB2FFF96}" type="datetimeFigureOut">
               <a:rPr lang="en-US" smtClean="0"/>
-              <a:t>9/10/19</a:t>
+              <a:t>9/12/19</a:t>
             </a:fld>
             <a:endParaRPr lang="en-US"/>
           </a:p>
@@ -2671,13 +2361,7 @@
       </p:sp>
       <p:sp>
         <p:nvSpPr>
-          <p:cNvPr id="6" name="Footer Placeholder 5">
-            <a:extLst>
-              <a:ext uri="{FF2B5EF4-FFF2-40B4-BE49-F238E27FC236}">
-                <a16:creationId xmlns:a16="http://schemas.microsoft.com/office/drawing/2014/main" id="{66FC1266-C4C4-8E43-9BA2-F912248BAB60}"/>
-              </a:ext>
-            </a:extLst>
-          </p:cNvPr>
+          <p:cNvPr id="6" name="Footer Placeholder 5"/>
           <p:cNvSpPr>
             <a:spLocks noGrp="1"/>
           </p:cNvSpPr>
@@ -2696,13 +2380,7 @@
       </p:sp>
       <p:sp>
         <p:nvSpPr>
-          <p:cNvPr id="7" name="Slide Number Placeholder 6">
-            <a:extLst>
-              <a:ext uri="{FF2B5EF4-FFF2-40B4-BE49-F238E27FC236}">
-                <a16:creationId xmlns:a16="http://schemas.microsoft.com/office/drawing/2014/main" id="{240573BC-8C58-3642-8116-A4995EDE299E}"/>
-              </a:ext>
-            </a:extLst>
-          </p:cNvPr>
+          <p:cNvPr id="7" name="Slide Number Placeholder 6"/>
           <p:cNvSpPr>
             <a:spLocks noGrp="1"/>
           </p:cNvSpPr>
@@ -2726,7 +2404,7 @@
     </p:spTree>
     <p:extLst>
       <p:ext uri="{BB962C8B-B14F-4D97-AF65-F5344CB8AC3E}">
-        <p14:creationId xmlns:p14="http://schemas.microsoft.com/office/powerpoint/2010/main" val="878016033"/>
+        <p14:creationId xmlns:p14="http://schemas.microsoft.com/office/powerpoint/2010/main" val="1285466969"/>
       </p:ext>
     </p:extLst>
   </p:cSld>
@@ -2760,13 +2438,7 @@
       </p:grpSpPr>
       <p:sp>
         <p:nvSpPr>
-          <p:cNvPr id="2" name="Title Placeholder 1">
-            <a:extLst>
-              <a:ext uri="{FF2B5EF4-FFF2-40B4-BE49-F238E27FC236}">
-                <a16:creationId xmlns:a16="http://schemas.microsoft.com/office/drawing/2014/main" id="{DDE6EE37-BEAA-934A-8292-01DC61E8EC44}"/>
-              </a:ext>
-            </a:extLst>
-          </p:cNvPr>
+          <p:cNvPr id="2" name="Title Placeholder 1"/>
           <p:cNvSpPr>
             <a:spLocks noGrp="1"/>
           </p:cNvSpPr>
@@ -2776,8 +2448,8 @@
         </p:nvSpPr>
         <p:spPr>
           <a:xfrm>
-            <a:off x="838200" y="365125"/>
-            <a:ext cx="10515600" cy="1325563"/>
+            <a:off x="420737" y="345011"/>
+            <a:ext cx="5278339" cy="1252534"/>
           </a:xfrm>
           <a:prstGeom prst="rect">
             <a:avLst/>
@@ -2793,18 +2465,13 @@
               <a:rPr lang="en-US"/>
               <a:t>Click to edit Master title style</a:t>
             </a:r>
-          </a:p>
-        </p:txBody>
-      </p:sp>
-      <p:sp>
-        <p:nvSpPr>
-          <p:cNvPr id="3" name="Text Placeholder 2">
-            <a:extLst>
-              <a:ext uri="{FF2B5EF4-FFF2-40B4-BE49-F238E27FC236}">
-                <a16:creationId xmlns:a16="http://schemas.microsoft.com/office/drawing/2014/main" id="{079CB46A-8211-5745-8F2A-6CB90FF9A776}"/>
-              </a:ext>
-            </a:extLst>
-          </p:cNvPr>
+            <a:endParaRPr lang="en-US" dirty="0"/>
+          </a:p>
+        </p:txBody>
+      </p:sp>
+      <p:sp>
+        <p:nvSpPr>
+          <p:cNvPr id="3" name="Text Placeholder 2"/>
           <p:cNvSpPr>
             <a:spLocks noGrp="1"/>
           </p:cNvSpPr>
@@ -2814,8 +2481,8 @@
         </p:nvSpPr>
         <p:spPr>
           <a:xfrm>
-            <a:off x="838200" y="1825625"/>
-            <a:ext cx="10515600" cy="4351338"/>
+            <a:off x="420737" y="1725046"/>
+            <a:ext cx="5278339" cy="4111612"/>
           </a:xfrm>
           <a:prstGeom prst="rect">
             <a:avLst/>
@@ -2860,18 +2527,13 @@
               <a:rPr lang="en-US"/>
               <a:t>Fifth level</a:t>
             </a:r>
-          </a:p>
-        </p:txBody>
-      </p:sp>
-      <p:sp>
-        <p:nvSpPr>
-          <p:cNvPr id="4" name="Date Placeholder 3">
-            <a:extLst>
-              <a:ext uri="{FF2B5EF4-FFF2-40B4-BE49-F238E27FC236}">
-                <a16:creationId xmlns:a16="http://schemas.microsoft.com/office/drawing/2014/main" id="{5FC56DFE-D936-C94D-84ED-852AC41BA612}"/>
-              </a:ext>
-            </a:extLst>
-          </p:cNvPr>
+            <a:endParaRPr lang="en-US" dirty="0"/>
+          </a:p>
+        </p:txBody>
+      </p:sp>
+      <p:sp>
+        <p:nvSpPr>
+          <p:cNvPr id="4" name="Date Placeholder 3"/>
           <p:cNvSpPr>
             <a:spLocks noGrp="1"/>
           </p:cNvSpPr>
@@ -2881,8 +2543,8 @@
         </p:nvSpPr>
         <p:spPr>
           <a:xfrm>
-            <a:off x="838200" y="6356350"/>
-            <a:ext cx="2743200" cy="365125"/>
+            <a:off x="420737" y="6006164"/>
+            <a:ext cx="1376958" cy="345009"/>
           </a:xfrm>
           <a:prstGeom prst="rect">
             <a:avLst/>
@@ -2892,7 +2554,7 @@
           <a:bodyPr vert="horz" lIns="91440" tIns="45720" rIns="91440" bIns="45720" rtlCol="0" anchor="ctr"/>
           <a:lstStyle>
             <a:lvl1pPr algn="l">
-              <a:defRPr sz="1200">
+              <a:defRPr sz="803">
                 <a:solidFill>
                   <a:schemeClr val="tx1">
                     <a:tint val="75000"/>
@@ -2904,7 +2566,7 @@
           <a:p>
             <a:fld id="{2412A0D1-1243-3144-AEF2-A5C0AB2FFF96}" type="datetimeFigureOut">
               <a:rPr lang="en-US" smtClean="0"/>
-              <a:t>9/10/19</a:t>
+              <a:t>9/12/19</a:t>
             </a:fld>
             <a:endParaRPr lang="en-US"/>
           </a:p>
@@ -2912,13 +2574,7 @@
       </p:sp>
       <p:sp>
         <p:nvSpPr>
-          <p:cNvPr id="5" name="Footer Placeholder 4">
-            <a:extLst>
-              <a:ext uri="{FF2B5EF4-FFF2-40B4-BE49-F238E27FC236}">
-                <a16:creationId xmlns:a16="http://schemas.microsoft.com/office/drawing/2014/main" id="{AB8891EC-8049-FE4F-AC87-0AEB61673E98}"/>
-              </a:ext>
-            </a:extLst>
-          </p:cNvPr>
+          <p:cNvPr id="5" name="Footer Placeholder 4"/>
           <p:cNvSpPr>
             <a:spLocks noGrp="1"/>
           </p:cNvSpPr>
@@ -2928,8 +2584,8 @@
         </p:nvSpPr>
         <p:spPr>
           <a:xfrm>
-            <a:off x="4038600" y="6356350"/>
-            <a:ext cx="4114800" cy="365125"/>
+            <a:off x="2027188" y="6006164"/>
+            <a:ext cx="2065437" cy="345009"/>
           </a:xfrm>
           <a:prstGeom prst="rect">
             <a:avLst/>
@@ -2939,7 +2595,7 @@
           <a:bodyPr vert="horz" lIns="91440" tIns="45720" rIns="91440" bIns="45720" rtlCol="0" anchor="ctr"/>
           <a:lstStyle>
             <a:lvl1pPr algn="ctr">
-              <a:defRPr sz="1200">
+              <a:defRPr sz="803">
                 <a:solidFill>
                   <a:schemeClr val="tx1">
                     <a:tint val="75000"/>
@@ -2955,13 +2611,7 @@
       </p:sp>
       <p:sp>
         <p:nvSpPr>
-          <p:cNvPr id="6" name="Slide Number Placeholder 5">
-            <a:extLst>
-              <a:ext uri="{FF2B5EF4-FFF2-40B4-BE49-F238E27FC236}">
-                <a16:creationId xmlns:a16="http://schemas.microsoft.com/office/drawing/2014/main" id="{45E9EB90-8A36-B041-BD15-C8E19D5C0655}"/>
-              </a:ext>
-            </a:extLst>
-          </p:cNvPr>
+          <p:cNvPr id="6" name="Slide Number Placeholder 5"/>
           <p:cNvSpPr>
             <a:spLocks noGrp="1"/>
           </p:cNvSpPr>
@@ -2971,8 +2621,8 @@
         </p:nvSpPr>
         <p:spPr>
           <a:xfrm>
-            <a:off x="8610600" y="6356350"/>
-            <a:ext cx="2743200" cy="365125"/>
+            <a:off x="4322118" y="6006164"/>
+            <a:ext cx="1376958" cy="345009"/>
           </a:xfrm>
           <a:prstGeom prst="rect">
             <a:avLst/>
@@ -2982,7 +2632,7 @@
           <a:bodyPr vert="horz" lIns="91440" tIns="45720" rIns="91440" bIns="45720" rtlCol="0" anchor="ctr"/>
           <a:lstStyle>
             <a:lvl1pPr algn="r">
-              <a:defRPr sz="1200">
+              <a:defRPr sz="803">
                 <a:solidFill>
                   <a:schemeClr val="tx1">
                     <a:tint val="75000"/>
@@ -3003,27 +2653,27 @@
     </p:spTree>
     <p:extLst>
       <p:ext uri="{BB962C8B-B14F-4D97-AF65-F5344CB8AC3E}">
-        <p14:creationId xmlns:p14="http://schemas.microsoft.com/office/powerpoint/2010/main" val="2053555390"/>
+        <p14:creationId xmlns:p14="http://schemas.microsoft.com/office/powerpoint/2010/main" val="519368816"/>
       </p:ext>
     </p:extLst>
   </p:cSld>
   <p:clrMap bg1="lt1" tx1="dk1" bg2="lt2" tx2="dk2" accent1="accent1" accent2="accent2" accent3="accent3" accent4="accent4" accent5="accent5" accent6="accent6" hlink="hlink" folHlink="folHlink"/>
   <p:sldLayoutIdLst>
-    <p:sldLayoutId id="2147483649" r:id="rId1"/>
-    <p:sldLayoutId id="2147483650" r:id="rId2"/>
-    <p:sldLayoutId id="2147483651" r:id="rId3"/>
-    <p:sldLayoutId id="2147483652" r:id="rId4"/>
-    <p:sldLayoutId id="2147483653" r:id="rId5"/>
-    <p:sldLayoutId id="2147483654" r:id="rId6"/>
-    <p:sldLayoutId id="2147483655" r:id="rId7"/>
-    <p:sldLayoutId id="2147483656" r:id="rId8"/>
-    <p:sldLayoutId id="2147483657" r:id="rId9"/>
-    <p:sldLayoutId id="2147483658" r:id="rId10"/>
-    <p:sldLayoutId id="2147483659" r:id="rId11"/>
+    <p:sldLayoutId id="2147483685" r:id="rId1"/>
+    <p:sldLayoutId id="2147483686" r:id="rId2"/>
+    <p:sldLayoutId id="2147483687" r:id="rId3"/>
+    <p:sldLayoutId id="2147483688" r:id="rId4"/>
+    <p:sldLayoutId id="2147483689" r:id="rId5"/>
+    <p:sldLayoutId id="2147483690" r:id="rId6"/>
+    <p:sldLayoutId id="2147483691" r:id="rId7"/>
+    <p:sldLayoutId id="2147483692" r:id="rId8"/>
+    <p:sldLayoutId id="2147483693" r:id="rId9"/>
+    <p:sldLayoutId id="2147483694" r:id="rId10"/>
+    <p:sldLayoutId id="2147483695" r:id="rId11"/>
   </p:sldLayoutIdLst>
   <p:txStyles>
     <p:titleStyle>
-      <a:lvl1pPr algn="l" defTabSz="914400" rtl="0" eaLnBrk="1" latinLnBrk="0" hangingPunct="1">
+      <a:lvl1pPr algn="l" defTabSz="612008" rtl="0" eaLnBrk="1" latinLnBrk="0" hangingPunct="1">
         <a:lnSpc>
           <a:spcPct val="90000"/>
         </a:lnSpc>
@@ -3031,7 +2681,7 @@
           <a:spcPct val="0"/>
         </a:spcBef>
         <a:buNone/>
-        <a:defRPr sz="4400" kern="1200">
+        <a:defRPr sz="2945" kern="1200">
           <a:solidFill>
             <a:schemeClr val="tx1"/>
           </a:solidFill>
@@ -3042,16 +2692,16 @@
       </a:lvl1pPr>
     </p:titleStyle>
     <p:bodyStyle>
-      <a:lvl1pPr marL="228600" indent="-228600" algn="l" defTabSz="914400" rtl="0" eaLnBrk="1" latinLnBrk="0" hangingPunct="1">
+      <a:lvl1pPr marL="153002" indent="-153002" algn="l" defTabSz="612008" rtl="0" eaLnBrk="1" latinLnBrk="0" hangingPunct="1">
         <a:lnSpc>
           <a:spcPct val="90000"/>
         </a:lnSpc>
         <a:spcBef>
-          <a:spcPts val="1000"/>
+          <a:spcPts val="669"/>
         </a:spcBef>
         <a:buFont typeface="Arial" panose="020B0604020202020204" pitchFamily="34" charset="0"/>
         <a:buChar char="•"/>
-        <a:defRPr sz="2800" kern="1200">
+        <a:defRPr sz="1874" kern="1200">
           <a:solidFill>
             <a:schemeClr val="tx1"/>
           </a:solidFill>
@@ -3060,16 +2710,16 @@
           <a:cs typeface="+mn-cs"/>
         </a:defRPr>
       </a:lvl1pPr>
-      <a:lvl2pPr marL="685800" indent="-228600" algn="l" defTabSz="914400" rtl="0" eaLnBrk="1" latinLnBrk="0" hangingPunct="1">
+      <a:lvl2pPr marL="459006" indent="-153002" algn="l" defTabSz="612008" rtl="0" eaLnBrk="1" latinLnBrk="0" hangingPunct="1">
         <a:lnSpc>
           <a:spcPct val="90000"/>
         </a:lnSpc>
         <a:spcBef>
-          <a:spcPts val="500"/>
+          <a:spcPts val="335"/>
         </a:spcBef>
         <a:buFont typeface="Arial" panose="020B0604020202020204" pitchFamily="34" charset="0"/>
         <a:buChar char="•"/>
-        <a:defRPr sz="2400" kern="1200">
+        <a:defRPr sz="1606" kern="1200">
           <a:solidFill>
             <a:schemeClr val="tx1"/>
           </a:solidFill>
@@ -3078,16 +2728,16 @@
           <a:cs typeface="+mn-cs"/>
         </a:defRPr>
       </a:lvl2pPr>
-      <a:lvl3pPr marL="1143000" indent="-228600" algn="l" defTabSz="914400" rtl="0" eaLnBrk="1" latinLnBrk="0" hangingPunct="1">
+      <a:lvl3pPr marL="765010" indent="-153002" algn="l" defTabSz="612008" rtl="0" eaLnBrk="1" latinLnBrk="0" hangingPunct="1">
         <a:lnSpc>
           <a:spcPct val="90000"/>
         </a:lnSpc>
         <a:spcBef>
-          <a:spcPts val="500"/>
+          <a:spcPts val="335"/>
         </a:spcBef>
         <a:buFont typeface="Arial" panose="020B0604020202020204" pitchFamily="34" charset="0"/>
         <a:buChar char="•"/>
-        <a:defRPr sz="2000" kern="1200">
+        <a:defRPr sz="1339" kern="1200">
           <a:solidFill>
             <a:schemeClr val="tx1"/>
           </a:solidFill>
@@ -3096,16 +2746,16 @@
           <a:cs typeface="+mn-cs"/>
         </a:defRPr>
       </a:lvl3pPr>
-      <a:lvl4pPr marL="1600200" indent="-228600" algn="l" defTabSz="914400" rtl="0" eaLnBrk="1" latinLnBrk="0" hangingPunct="1">
+      <a:lvl4pPr marL="1071014" indent="-153002" algn="l" defTabSz="612008" rtl="0" eaLnBrk="1" latinLnBrk="0" hangingPunct="1">
         <a:lnSpc>
           <a:spcPct val="90000"/>
         </a:lnSpc>
         <a:spcBef>
-          <a:spcPts val="500"/>
+          <a:spcPts val="335"/>
         </a:spcBef>
         <a:buFont typeface="Arial" panose="020B0604020202020204" pitchFamily="34" charset="0"/>
         <a:buChar char="•"/>
-        <a:defRPr sz="1800" kern="1200">
+        <a:defRPr sz="1205" kern="1200">
           <a:solidFill>
             <a:schemeClr val="tx1"/>
           </a:solidFill>
@@ -3114,16 +2764,16 @@
           <a:cs typeface="+mn-cs"/>
         </a:defRPr>
       </a:lvl4pPr>
-      <a:lvl5pPr marL="2057400" indent="-228600" algn="l" defTabSz="914400" rtl="0" eaLnBrk="1" latinLnBrk="0" hangingPunct="1">
+      <a:lvl5pPr marL="1377018" indent="-153002" algn="l" defTabSz="612008" rtl="0" eaLnBrk="1" latinLnBrk="0" hangingPunct="1">
         <a:lnSpc>
           <a:spcPct val="90000"/>
         </a:lnSpc>
         <a:spcBef>
-          <a:spcPts val="500"/>
+          <a:spcPts val="335"/>
         </a:spcBef>
         <a:buFont typeface="Arial" panose="020B0604020202020204" pitchFamily="34" charset="0"/>
         <a:buChar char="•"/>
-        <a:defRPr sz="1800" kern="1200">
+        <a:defRPr sz="1205" kern="1200">
           <a:solidFill>
             <a:schemeClr val="tx1"/>
           </a:solidFill>
@@ -3132,16 +2782,16 @@
           <a:cs typeface="+mn-cs"/>
         </a:defRPr>
       </a:lvl5pPr>
-      <a:lvl6pPr marL="2514600" indent="-228600" algn="l" defTabSz="914400" rtl="0" eaLnBrk="1" latinLnBrk="0" hangingPunct="1">
+      <a:lvl6pPr marL="1683022" indent="-153002" algn="l" defTabSz="612008" rtl="0" eaLnBrk="1" latinLnBrk="0" hangingPunct="1">
         <a:lnSpc>
           <a:spcPct val="90000"/>
         </a:lnSpc>
         <a:spcBef>
-          <a:spcPts val="500"/>
+          <a:spcPts val="335"/>
         </a:spcBef>
         <a:buFont typeface="Arial" panose="020B0604020202020204" pitchFamily="34" charset="0"/>
         <a:buChar char="•"/>
-        <a:defRPr sz="1800" kern="1200">
+        <a:defRPr sz="1205" kern="1200">
           <a:solidFill>
             <a:schemeClr val="tx1"/>
           </a:solidFill>
@@ -3150,16 +2800,16 @@
           <a:cs typeface="+mn-cs"/>
         </a:defRPr>
       </a:lvl6pPr>
-      <a:lvl7pPr marL="2971800" indent="-228600" algn="l" defTabSz="914400" rtl="0" eaLnBrk="1" latinLnBrk="0" hangingPunct="1">
+      <a:lvl7pPr marL="1989026" indent="-153002" algn="l" defTabSz="612008" rtl="0" eaLnBrk="1" latinLnBrk="0" hangingPunct="1">
         <a:lnSpc>
           <a:spcPct val="90000"/>
         </a:lnSpc>
         <a:spcBef>
-          <a:spcPts val="500"/>
+          <a:spcPts val="335"/>
         </a:spcBef>
         <a:buFont typeface="Arial" panose="020B0604020202020204" pitchFamily="34" charset="0"/>
         <a:buChar char="•"/>
-        <a:defRPr sz="1800" kern="1200">
+        <a:defRPr sz="1205" kern="1200">
           <a:solidFill>
             <a:schemeClr val="tx1"/>
           </a:solidFill>
@@ -3168,16 +2818,16 @@
           <a:cs typeface="+mn-cs"/>
         </a:defRPr>
       </a:lvl7pPr>
-      <a:lvl8pPr marL="3429000" indent="-228600" algn="l" defTabSz="914400" rtl="0" eaLnBrk="1" latinLnBrk="0" hangingPunct="1">
+      <a:lvl8pPr marL="2295030" indent="-153002" algn="l" defTabSz="612008" rtl="0" eaLnBrk="1" latinLnBrk="0" hangingPunct="1">
         <a:lnSpc>
           <a:spcPct val="90000"/>
         </a:lnSpc>
         <a:spcBef>
-          <a:spcPts val="500"/>
+          <a:spcPts val="335"/>
         </a:spcBef>
         <a:buFont typeface="Arial" panose="020B0604020202020204" pitchFamily="34" charset="0"/>
         <a:buChar char="•"/>
-        <a:defRPr sz="1800" kern="1200">
+        <a:defRPr sz="1205" kern="1200">
           <a:solidFill>
             <a:schemeClr val="tx1"/>
           </a:solidFill>
@@ -3186,16 +2836,16 @@
           <a:cs typeface="+mn-cs"/>
         </a:defRPr>
       </a:lvl8pPr>
-      <a:lvl9pPr marL="3886200" indent="-228600" algn="l" defTabSz="914400" rtl="0" eaLnBrk="1" latinLnBrk="0" hangingPunct="1">
+      <a:lvl9pPr marL="2601034" indent="-153002" algn="l" defTabSz="612008" rtl="0" eaLnBrk="1" latinLnBrk="0" hangingPunct="1">
         <a:lnSpc>
           <a:spcPct val="90000"/>
         </a:lnSpc>
         <a:spcBef>
-          <a:spcPts val="500"/>
+          <a:spcPts val="335"/>
         </a:spcBef>
         <a:buFont typeface="Arial" panose="020B0604020202020204" pitchFamily="34" charset="0"/>
         <a:buChar char="•"/>
-        <a:defRPr sz="1800" kern="1200">
+        <a:defRPr sz="1205" kern="1200">
           <a:solidFill>
             <a:schemeClr val="tx1"/>
           </a:solidFill>
@@ -3207,10 +2857,10 @@
     </p:bodyStyle>
     <p:otherStyle>
       <a:defPPr>
-        <a:defRPr lang="pl-PL"/>
+        <a:defRPr lang="en-US"/>
       </a:defPPr>
-      <a:lvl1pPr marL="0" algn="l" defTabSz="914400" rtl="0" eaLnBrk="1" latinLnBrk="0" hangingPunct="1">
-        <a:defRPr sz="1800" kern="1200">
+      <a:lvl1pPr marL="0" algn="l" defTabSz="612008" rtl="0" eaLnBrk="1" latinLnBrk="0" hangingPunct="1">
+        <a:defRPr sz="1205" kern="1200">
           <a:solidFill>
             <a:schemeClr val="tx1"/>
           </a:solidFill>
@@ -3219,8 +2869,8 @@
           <a:cs typeface="+mn-cs"/>
         </a:defRPr>
       </a:lvl1pPr>
-      <a:lvl2pPr marL="457200" algn="l" defTabSz="914400" rtl="0" eaLnBrk="1" latinLnBrk="0" hangingPunct="1">
-        <a:defRPr sz="1800" kern="1200">
+      <a:lvl2pPr marL="306004" algn="l" defTabSz="612008" rtl="0" eaLnBrk="1" latinLnBrk="0" hangingPunct="1">
+        <a:defRPr sz="1205" kern="1200">
           <a:solidFill>
             <a:schemeClr val="tx1"/>
           </a:solidFill>
@@ -3229,8 +2879,8 @@
           <a:cs typeface="+mn-cs"/>
         </a:defRPr>
       </a:lvl2pPr>
-      <a:lvl3pPr marL="914400" algn="l" defTabSz="914400" rtl="0" eaLnBrk="1" latinLnBrk="0" hangingPunct="1">
-        <a:defRPr sz="1800" kern="1200">
+      <a:lvl3pPr marL="612008" algn="l" defTabSz="612008" rtl="0" eaLnBrk="1" latinLnBrk="0" hangingPunct="1">
+        <a:defRPr sz="1205" kern="1200">
           <a:solidFill>
             <a:schemeClr val="tx1"/>
           </a:solidFill>
@@ -3239,8 +2889,8 @@
           <a:cs typeface="+mn-cs"/>
         </a:defRPr>
       </a:lvl3pPr>
-      <a:lvl4pPr marL="1371600" algn="l" defTabSz="914400" rtl="0" eaLnBrk="1" latinLnBrk="0" hangingPunct="1">
-        <a:defRPr sz="1800" kern="1200">
+      <a:lvl4pPr marL="918012" algn="l" defTabSz="612008" rtl="0" eaLnBrk="1" latinLnBrk="0" hangingPunct="1">
+        <a:defRPr sz="1205" kern="1200">
           <a:solidFill>
             <a:schemeClr val="tx1"/>
           </a:solidFill>
@@ -3249,8 +2899,8 @@
           <a:cs typeface="+mn-cs"/>
         </a:defRPr>
       </a:lvl4pPr>
-      <a:lvl5pPr marL="1828800" algn="l" defTabSz="914400" rtl="0" eaLnBrk="1" latinLnBrk="0" hangingPunct="1">
-        <a:defRPr sz="1800" kern="1200">
+      <a:lvl5pPr marL="1224016" algn="l" defTabSz="612008" rtl="0" eaLnBrk="1" latinLnBrk="0" hangingPunct="1">
+        <a:defRPr sz="1205" kern="1200">
           <a:solidFill>
             <a:schemeClr val="tx1"/>
           </a:solidFill>
@@ -3259,8 +2909,8 @@
           <a:cs typeface="+mn-cs"/>
         </a:defRPr>
       </a:lvl5pPr>
-      <a:lvl6pPr marL="2286000" algn="l" defTabSz="914400" rtl="0" eaLnBrk="1" latinLnBrk="0" hangingPunct="1">
-        <a:defRPr sz="1800" kern="1200">
+      <a:lvl6pPr marL="1530020" algn="l" defTabSz="612008" rtl="0" eaLnBrk="1" latinLnBrk="0" hangingPunct="1">
+        <a:defRPr sz="1205" kern="1200">
           <a:solidFill>
             <a:schemeClr val="tx1"/>
           </a:solidFill>
@@ -3269,8 +2919,8 @@
           <a:cs typeface="+mn-cs"/>
         </a:defRPr>
       </a:lvl6pPr>
-      <a:lvl7pPr marL="2743200" algn="l" defTabSz="914400" rtl="0" eaLnBrk="1" latinLnBrk="0" hangingPunct="1">
-        <a:defRPr sz="1800" kern="1200">
+      <a:lvl7pPr marL="1836024" algn="l" defTabSz="612008" rtl="0" eaLnBrk="1" latinLnBrk="0" hangingPunct="1">
+        <a:defRPr sz="1205" kern="1200">
           <a:solidFill>
             <a:schemeClr val="tx1"/>
           </a:solidFill>
@@ -3279,8 +2929,8 @@
           <a:cs typeface="+mn-cs"/>
         </a:defRPr>
       </a:lvl7pPr>
-      <a:lvl8pPr marL="3200400" algn="l" defTabSz="914400" rtl="0" eaLnBrk="1" latinLnBrk="0" hangingPunct="1">
-        <a:defRPr sz="1800" kern="1200">
+      <a:lvl8pPr marL="2142028" algn="l" defTabSz="612008" rtl="0" eaLnBrk="1" latinLnBrk="0" hangingPunct="1">
+        <a:defRPr sz="1205" kern="1200">
           <a:solidFill>
             <a:schemeClr val="tx1"/>
           </a:solidFill>
@@ -3289,8 +2939,8 @@
           <a:cs typeface="+mn-cs"/>
         </a:defRPr>
       </a:lvl8pPr>
-      <a:lvl9pPr marL="3657600" algn="l" defTabSz="914400" rtl="0" eaLnBrk="1" latinLnBrk="0" hangingPunct="1">
-        <a:defRPr sz="1800" kern="1200">
+      <a:lvl9pPr marL="2448032" algn="l" defTabSz="612008" rtl="0" eaLnBrk="1" latinLnBrk="0" hangingPunct="1">
+        <a:defRPr sz="1205" kern="1200">
           <a:solidFill>
             <a:schemeClr val="tx1"/>
           </a:solidFill>
@@ -3335,7 +2985,7 @@
         </p:nvSpPr>
         <p:spPr>
           <a:xfrm>
-            <a:off x="2835467" y="2965711"/>
+            <a:off x="2808119" y="3027649"/>
             <a:ext cx="300992" cy="1582677"/>
           </a:xfrm>
           <a:prstGeom prst="rect">
@@ -3369,7 +3019,7 @@
           <a:lstStyle/>
           <a:p>
             <a:pPr algn="ctr"/>
-            <a:endParaRPr lang="en-US"/>
+            <a:endParaRPr lang="en-US" sz="1701"/>
           </a:p>
         </p:txBody>
       </p:sp>
@@ -3387,7 +3037,7 @@
         </p:nvSpPr>
         <p:spPr>
           <a:xfrm>
-            <a:off x="2831156" y="903890"/>
+            <a:off x="2803808" y="1183178"/>
             <a:ext cx="300992" cy="1267100"/>
           </a:xfrm>
           <a:prstGeom prst="rect">
@@ -3421,7 +3071,7 @@
           <a:lstStyle/>
           <a:p>
             <a:pPr algn="ctr"/>
-            <a:endParaRPr lang="en-US"/>
+            <a:endParaRPr lang="en-US" sz="1701"/>
           </a:p>
         </p:txBody>
       </p:sp>
@@ -3441,8 +3091,8 @@
         </p:nvCxnSpPr>
         <p:spPr>
           <a:xfrm>
-            <a:off x="246658" y="703875"/>
-            <a:ext cx="0" cy="5910720"/>
+            <a:off x="219310" y="765809"/>
+            <a:ext cx="0" cy="4431890"/>
           </a:xfrm>
           <a:prstGeom prst="line">
             <a:avLst/>
@@ -3482,8 +3132,8 @@
         </p:nvCxnSpPr>
         <p:spPr>
           <a:xfrm>
-            <a:off x="537281" y="703875"/>
-            <a:ext cx="0" cy="5910720"/>
+            <a:off x="509933" y="765809"/>
+            <a:ext cx="0" cy="4431890"/>
           </a:xfrm>
           <a:prstGeom prst="line">
             <a:avLst/>
@@ -3529,8 +3179,8 @@
         </p:nvCxnSpPr>
         <p:spPr>
           <a:xfrm>
-            <a:off x="827904" y="703875"/>
-            <a:ext cx="0" cy="5910720"/>
+            <a:off x="800556" y="765809"/>
+            <a:ext cx="0" cy="4431890"/>
           </a:xfrm>
           <a:prstGeom prst="line">
             <a:avLst/>
@@ -3570,8 +3220,8 @@
         </p:nvCxnSpPr>
         <p:spPr>
           <a:xfrm>
-            <a:off x="1118527" y="703875"/>
-            <a:ext cx="0" cy="5910720"/>
+            <a:off x="1091179" y="765809"/>
+            <a:ext cx="0" cy="4431890"/>
           </a:xfrm>
           <a:prstGeom prst="line">
             <a:avLst/>
@@ -3617,8 +3267,8 @@
         </p:nvCxnSpPr>
         <p:spPr>
           <a:xfrm>
-            <a:off x="1409150" y="703875"/>
-            <a:ext cx="0" cy="5910720"/>
+            <a:off x="1381802" y="765809"/>
+            <a:ext cx="0" cy="4431890"/>
           </a:xfrm>
           <a:prstGeom prst="line">
             <a:avLst/>
@@ -3658,8 +3308,8 @@
         </p:nvCxnSpPr>
         <p:spPr>
           <a:xfrm>
-            <a:off x="1690978" y="703875"/>
-            <a:ext cx="0" cy="5910720"/>
+            <a:off x="1663630" y="765809"/>
+            <a:ext cx="0" cy="4431890"/>
           </a:xfrm>
           <a:prstGeom prst="line">
             <a:avLst/>
@@ -3705,8 +3355,8 @@
         </p:nvCxnSpPr>
         <p:spPr>
           <a:xfrm>
-            <a:off x="1989739" y="703875"/>
-            <a:ext cx="0" cy="5910720"/>
+            <a:off x="1962391" y="765809"/>
+            <a:ext cx="0" cy="4431890"/>
           </a:xfrm>
           <a:prstGeom prst="line">
             <a:avLst/>
@@ -3746,8 +3396,8 @@
         </p:nvCxnSpPr>
         <p:spPr>
           <a:xfrm>
-            <a:off x="2280362" y="703875"/>
-            <a:ext cx="0" cy="5910720"/>
+            <a:off x="2253014" y="765809"/>
+            <a:ext cx="0" cy="4431890"/>
           </a:xfrm>
           <a:prstGeom prst="line">
             <a:avLst/>
@@ -3793,8 +3443,8 @@
         </p:nvCxnSpPr>
         <p:spPr>
           <a:xfrm>
-            <a:off x="2550901" y="703875"/>
-            <a:ext cx="0" cy="5910720"/>
+            <a:off x="2523553" y="765809"/>
+            <a:ext cx="0" cy="4431890"/>
           </a:xfrm>
           <a:prstGeom prst="line">
             <a:avLst/>
@@ -3834,8 +3484,8 @@
         </p:nvCxnSpPr>
         <p:spPr>
           <a:xfrm>
-            <a:off x="2841524" y="703875"/>
-            <a:ext cx="0" cy="5910720"/>
+            <a:off x="2814176" y="765809"/>
+            <a:ext cx="0" cy="4431890"/>
           </a:xfrm>
           <a:prstGeom prst="line">
             <a:avLst/>
@@ -3881,8 +3531,8 @@
         </p:nvCxnSpPr>
         <p:spPr>
           <a:xfrm>
-            <a:off x="3132147" y="703875"/>
-            <a:ext cx="0" cy="5910720"/>
+            <a:off x="3104799" y="765809"/>
+            <a:ext cx="0" cy="4431890"/>
           </a:xfrm>
           <a:prstGeom prst="line">
             <a:avLst/>
@@ -3922,8 +3572,8 @@
         </p:nvCxnSpPr>
         <p:spPr>
           <a:xfrm>
-            <a:off x="3422770" y="703875"/>
-            <a:ext cx="0" cy="5910720"/>
+            <a:off x="3395422" y="765809"/>
+            <a:ext cx="0" cy="4431890"/>
           </a:xfrm>
           <a:prstGeom prst="line">
             <a:avLst/>
@@ -3969,8 +3619,8 @@
         </p:nvCxnSpPr>
         <p:spPr>
           <a:xfrm>
-            <a:off x="3713393" y="703875"/>
-            <a:ext cx="0" cy="5910720"/>
+            <a:off x="3686045" y="765809"/>
+            <a:ext cx="0" cy="4431890"/>
           </a:xfrm>
           <a:prstGeom prst="line">
             <a:avLst/>
@@ -4008,7 +3658,7 @@
         </p:nvSpPr>
         <p:spPr>
           <a:xfrm rot="18000000">
-            <a:off x="-79555" y="229514"/>
+            <a:off x="-106903" y="291451"/>
             <a:ext cx="829073" cy="307777"/>
           </a:xfrm>
           <a:prstGeom prst="rect">
@@ -4056,7 +3706,7 @@
         </p:nvSpPr>
         <p:spPr>
           <a:xfrm rot="18000000">
-            <a:off x="233510" y="224817"/>
+            <a:off x="206165" y="286755"/>
             <a:ext cx="784189" cy="307777"/>
           </a:xfrm>
           <a:prstGeom prst="rect">
@@ -4092,7 +3742,7 @@
         </p:nvSpPr>
         <p:spPr>
           <a:xfrm rot="18000000">
-            <a:off x="495646" y="220118"/>
+            <a:off x="468301" y="282056"/>
             <a:ext cx="829073" cy="307777"/>
           </a:xfrm>
           <a:prstGeom prst="rect">
@@ -4140,7 +3790,7 @@
         </p:nvSpPr>
         <p:spPr>
           <a:xfrm rot="18000000">
-            <a:off x="808711" y="229514"/>
+            <a:off x="781367" y="291453"/>
             <a:ext cx="784189" cy="307777"/>
           </a:xfrm>
           <a:prstGeom prst="rect">
@@ -4176,7 +3826,7 @@
         </p:nvSpPr>
         <p:spPr>
           <a:xfrm rot="18000000">
-            <a:off x="1076892" y="224817"/>
+            <a:off x="1049547" y="286755"/>
             <a:ext cx="829073" cy="307777"/>
           </a:xfrm>
           <a:prstGeom prst="rect">
@@ -4224,7 +3874,7 @@
         </p:nvSpPr>
         <p:spPr>
           <a:xfrm rot="18000000">
-            <a:off x="1383911" y="220118"/>
+            <a:off x="1356567" y="282056"/>
             <a:ext cx="784189" cy="307777"/>
           </a:xfrm>
           <a:prstGeom prst="rect">
@@ -4260,7 +3910,7 @@
         </p:nvSpPr>
         <p:spPr>
           <a:xfrm rot="18000000">
-            <a:off x="1651396" y="229514"/>
+            <a:off x="1624051" y="291453"/>
             <a:ext cx="829073" cy="307777"/>
           </a:xfrm>
           <a:prstGeom prst="rect">
@@ -4308,7 +3958,7 @@
         </p:nvSpPr>
         <p:spPr>
           <a:xfrm rot="18000000">
-            <a:off x="1964462" y="224817"/>
+            <a:off x="1937117" y="286755"/>
             <a:ext cx="784189" cy="307777"/>
           </a:xfrm>
           <a:prstGeom prst="rect">
@@ -4344,7 +3994,7 @@
         </p:nvSpPr>
         <p:spPr>
           <a:xfrm rot="18000000">
-            <a:off x="2226596" y="220118"/>
+            <a:off x="2199251" y="282056"/>
             <a:ext cx="829073" cy="307777"/>
           </a:xfrm>
           <a:prstGeom prst="rect">
@@ -4392,7 +4042,7 @@
         </p:nvSpPr>
         <p:spPr>
           <a:xfrm rot="18000000">
-            <a:off x="2539660" y="229514"/>
+            <a:off x="2512315" y="291453"/>
             <a:ext cx="784189" cy="307777"/>
           </a:xfrm>
           <a:prstGeom prst="rect">
@@ -4428,7 +4078,7 @@
         </p:nvSpPr>
         <p:spPr>
           <a:xfrm rot="18000000">
-            <a:off x="2807843" y="224817"/>
+            <a:off x="2780499" y="286755"/>
             <a:ext cx="829073" cy="307777"/>
           </a:xfrm>
           <a:prstGeom prst="rect">
@@ -4476,7 +4126,7 @@
         </p:nvSpPr>
         <p:spPr>
           <a:xfrm rot="18000000">
-            <a:off x="3114861" y="220118"/>
+            <a:off x="3087518" y="282056"/>
             <a:ext cx="784189" cy="307777"/>
           </a:xfrm>
           <a:prstGeom prst="rect">
@@ -4512,7 +4162,7 @@
         </p:nvSpPr>
         <p:spPr>
           <a:xfrm rot="18000000">
-            <a:off x="3381729" y="229513"/>
+            <a:off x="3354385" y="291452"/>
             <a:ext cx="829073" cy="307777"/>
           </a:xfrm>
           <a:prstGeom prst="rect">
@@ -4562,8 +4212,8 @@
         </p:nvCxnSpPr>
         <p:spPr>
           <a:xfrm>
-            <a:off x="4004016" y="703875"/>
-            <a:ext cx="0" cy="5910720"/>
+            <a:off x="3976668" y="765809"/>
+            <a:ext cx="0" cy="4431890"/>
           </a:xfrm>
           <a:prstGeom prst="line">
             <a:avLst/>
@@ -4609,8 +4259,8 @@
         </p:nvCxnSpPr>
         <p:spPr>
           <a:xfrm>
-            <a:off x="4294639" y="703875"/>
-            <a:ext cx="0" cy="5910720"/>
+            <a:off x="4267290" y="765809"/>
+            <a:ext cx="0" cy="4431890"/>
           </a:xfrm>
           <a:prstGeom prst="line">
             <a:avLst/>
@@ -4650,8 +4300,8 @@
         </p:nvCxnSpPr>
         <p:spPr>
           <a:xfrm>
-            <a:off x="4585262" y="703875"/>
-            <a:ext cx="0" cy="5910720"/>
+            <a:off x="4557914" y="765809"/>
+            <a:ext cx="0" cy="4431890"/>
           </a:xfrm>
           <a:prstGeom prst="line">
             <a:avLst/>
@@ -4697,8 +4347,8 @@
         </p:nvCxnSpPr>
         <p:spPr>
           <a:xfrm>
-            <a:off x="4875885" y="703875"/>
-            <a:ext cx="0" cy="5910720"/>
+            <a:off x="4848537" y="765809"/>
+            <a:ext cx="0" cy="4431890"/>
           </a:xfrm>
           <a:prstGeom prst="line">
             <a:avLst/>
@@ -4738,8 +4388,8 @@
         </p:nvCxnSpPr>
         <p:spPr>
           <a:xfrm>
-            <a:off x="5157713" y="703875"/>
-            <a:ext cx="0" cy="5910720"/>
+            <a:off x="5130366" y="765809"/>
+            <a:ext cx="0" cy="4431890"/>
           </a:xfrm>
           <a:prstGeom prst="line">
             <a:avLst/>
@@ -4785,8 +4435,8 @@
         </p:nvCxnSpPr>
         <p:spPr>
           <a:xfrm>
-            <a:off x="5456474" y="703875"/>
-            <a:ext cx="0" cy="5910720"/>
+            <a:off x="5429126" y="765809"/>
+            <a:ext cx="0" cy="4431890"/>
           </a:xfrm>
           <a:prstGeom prst="line">
             <a:avLst/>
@@ -4826,8 +4476,8 @@
         </p:nvCxnSpPr>
         <p:spPr>
           <a:xfrm>
-            <a:off x="5747097" y="703875"/>
-            <a:ext cx="0" cy="5910720"/>
+            <a:off x="5719749" y="765809"/>
+            <a:ext cx="0" cy="4431890"/>
           </a:xfrm>
           <a:prstGeom prst="line">
             <a:avLst/>
@@ -4871,7 +4521,7 @@
         </p:nvSpPr>
         <p:spPr>
           <a:xfrm rot="18000000">
-            <a:off x="3694793" y="224816"/>
+            <a:off x="3667450" y="286754"/>
             <a:ext cx="784189" cy="307777"/>
           </a:xfrm>
           <a:prstGeom prst="rect">
@@ -4907,7 +4557,7 @@
         </p:nvSpPr>
         <p:spPr>
           <a:xfrm rot="18000000">
-            <a:off x="3956928" y="220117"/>
+            <a:off x="3929584" y="282055"/>
             <a:ext cx="829073" cy="307777"/>
           </a:xfrm>
           <a:prstGeom prst="rect">
@@ -4955,7 +4605,7 @@
         </p:nvSpPr>
         <p:spPr>
           <a:xfrm rot="18000000">
-            <a:off x="4269993" y="229513"/>
+            <a:off x="4242650" y="291452"/>
             <a:ext cx="784189" cy="307777"/>
           </a:xfrm>
           <a:prstGeom prst="rect">
@@ -4991,7 +4641,7 @@
         </p:nvSpPr>
         <p:spPr>
           <a:xfrm rot="18000000">
-            <a:off x="4538174" y="224816"/>
+            <a:off x="4510831" y="286754"/>
             <a:ext cx="829073" cy="307777"/>
           </a:xfrm>
           <a:prstGeom prst="rect">
@@ -5039,7 +4689,7 @@
         </p:nvSpPr>
         <p:spPr>
           <a:xfrm rot="18000000">
-            <a:off x="4845193" y="220117"/>
+            <a:off x="4817849" y="282055"/>
             <a:ext cx="784189" cy="307777"/>
           </a:xfrm>
           <a:prstGeom prst="rect">
@@ -5075,7 +4725,7 @@
         </p:nvSpPr>
         <p:spPr>
           <a:xfrm rot="18000000">
-            <a:off x="5112678" y="229513"/>
+            <a:off x="5085334" y="291452"/>
             <a:ext cx="829073" cy="307777"/>
           </a:xfrm>
           <a:prstGeom prst="rect">
@@ -5123,7 +4773,7 @@
         </p:nvSpPr>
         <p:spPr>
           <a:xfrm rot="18000000">
-            <a:off x="5425744" y="224816"/>
+            <a:off x="5398400" y="286754"/>
             <a:ext cx="784189" cy="307777"/>
           </a:xfrm>
           <a:prstGeom prst="rect">
@@ -5159,7 +4809,7 @@
         </p:nvSpPr>
         <p:spPr>
           <a:xfrm>
-            <a:off x="246658" y="903890"/>
+            <a:off x="219313" y="1183178"/>
             <a:ext cx="2885489" cy="178676"/>
           </a:xfrm>
           <a:prstGeom prst="rect">
@@ -5190,7 +4840,7 @@
           <a:lstStyle/>
           <a:p>
             <a:pPr algn="ctr"/>
-            <a:endParaRPr lang="en-US"/>
+            <a:endParaRPr lang="en-US" sz="1701"/>
           </a:p>
         </p:txBody>
       </p:sp>
@@ -5208,7 +4858,7 @@
         </p:nvSpPr>
         <p:spPr>
           <a:xfrm>
-            <a:off x="1108158" y="1255986"/>
+            <a:off x="1080813" y="1535274"/>
             <a:ext cx="2887721" cy="178676"/>
           </a:xfrm>
           <a:prstGeom prst="rect">
@@ -5239,7 +4889,7 @@
           <a:lstStyle/>
           <a:p>
             <a:pPr algn="ctr"/>
-            <a:endParaRPr lang="en-US"/>
+            <a:endParaRPr lang="en-US" sz="1701"/>
           </a:p>
         </p:txBody>
       </p:sp>
@@ -5257,7 +4907,7 @@
         </p:nvSpPr>
         <p:spPr>
           <a:xfrm>
-            <a:off x="1986085" y="1608082"/>
+            <a:off x="1958739" y="1887370"/>
             <a:ext cx="2885489" cy="178676"/>
           </a:xfrm>
           <a:prstGeom prst="rect">
@@ -5288,7 +4938,7 @@
           <a:lstStyle/>
           <a:p>
             <a:pPr algn="ctr"/>
-            <a:endParaRPr lang="en-US"/>
+            <a:endParaRPr lang="en-US" sz="1701"/>
           </a:p>
         </p:txBody>
       </p:sp>
@@ -5306,8 +4956,8 @@
         </p:nvSpPr>
         <p:spPr>
           <a:xfrm>
-            <a:off x="2836116" y="1997664"/>
-            <a:ext cx="2910981" cy="173326"/>
+            <a:off x="2808768" y="2276952"/>
+            <a:ext cx="2910982" cy="173326"/>
           </a:xfrm>
           <a:prstGeom prst="rect">
             <a:avLst/>
@@ -5337,7 +4987,7 @@
           <a:lstStyle/>
           <a:p>
             <a:pPr algn="ctr"/>
-            <a:endParaRPr lang="en-US"/>
+            <a:endParaRPr lang="en-US" sz="1701"/>
           </a:p>
         </p:txBody>
       </p:sp>
@@ -5355,7 +5005,7 @@
         </p:nvSpPr>
         <p:spPr>
           <a:xfrm>
-            <a:off x="3713394" y="903890"/>
+            <a:off x="3686046" y="1183178"/>
             <a:ext cx="2033704" cy="178676"/>
           </a:xfrm>
           <a:prstGeom prst="rect">
@@ -5392,7 +5042,7 @@
           <a:lstStyle/>
           <a:p>
             <a:pPr algn="ctr"/>
-            <a:endParaRPr lang="en-US"/>
+            <a:endParaRPr lang="en-US" sz="1701"/>
           </a:p>
         </p:txBody>
       </p:sp>
@@ -5410,8 +5060,8 @@
         </p:nvSpPr>
         <p:spPr>
           <a:xfrm>
-            <a:off x="4585262" y="1253358"/>
-            <a:ext cx="1161835" cy="178676"/>
+            <a:off x="4557916" y="1532646"/>
+            <a:ext cx="1161834" cy="178676"/>
           </a:xfrm>
           <a:prstGeom prst="rect">
             <a:avLst/>
@@ -5447,7 +5097,7 @@
           <a:lstStyle/>
           <a:p>
             <a:pPr algn="ctr"/>
-            <a:endParaRPr lang="en-US"/>
+            <a:endParaRPr lang="en-US" sz="1701"/>
           </a:p>
         </p:txBody>
       </p:sp>
@@ -5465,8 +5115,8 @@
         </p:nvSpPr>
         <p:spPr>
           <a:xfrm>
-            <a:off x="5456474" y="1602826"/>
-            <a:ext cx="298761" cy="183932"/>
+            <a:off x="5429129" y="1882115"/>
+            <a:ext cx="298760" cy="183932"/>
           </a:xfrm>
           <a:prstGeom prst="rect">
             <a:avLst/>
@@ -5502,7 +5152,7 @@
           <a:lstStyle/>
           <a:p>
             <a:pPr algn="ctr"/>
-            <a:endParaRPr lang="en-US"/>
+            <a:endParaRPr lang="en-US" sz="1701"/>
           </a:p>
         </p:txBody>
       </p:sp>
@@ -5520,7 +5170,7 @@
         </p:nvSpPr>
         <p:spPr>
           <a:xfrm>
-            <a:off x="246657" y="1253358"/>
+            <a:off x="219309" y="1532646"/>
             <a:ext cx="282486" cy="178676"/>
           </a:xfrm>
           <a:prstGeom prst="rect">
@@ -5557,7 +5207,7 @@
           <a:lstStyle/>
           <a:p>
             <a:pPr algn="ctr"/>
-            <a:endParaRPr lang="en-US"/>
+            <a:endParaRPr lang="en-US" sz="1701"/>
           </a:p>
         </p:txBody>
       </p:sp>
@@ -5575,7 +5225,7 @@
         </p:nvSpPr>
         <p:spPr>
           <a:xfrm>
-            <a:off x="252067" y="1608082"/>
+            <a:off x="224719" y="1887370"/>
             <a:ext cx="1157822" cy="178676"/>
           </a:xfrm>
           <a:prstGeom prst="rect">
@@ -5612,7 +5262,7 @@
           <a:lstStyle/>
           <a:p>
             <a:pPr algn="ctr"/>
-            <a:endParaRPr lang="en-US"/>
+            <a:endParaRPr lang="en-US" sz="1701"/>
           </a:p>
         </p:txBody>
       </p:sp>
@@ -5630,7 +5280,7 @@
         </p:nvSpPr>
         <p:spPr>
           <a:xfrm>
-            <a:off x="246658" y="1997664"/>
+            <a:off x="219310" y="2276952"/>
             <a:ext cx="2033704" cy="178676"/>
           </a:xfrm>
           <a:prstGeom prst="rect">
@@ -5667,7 +5317,7 @@
           <a:lstStyle/>
           <a:p>
             <a:pPr algn="ctr"/>
-            <a:endParaRPr lang="en-US"/>
+            <a:endParaRPr lang="en-US" sz="1701"/>
           </a:p>
         </p:txBody>
       </p:sp>
@@ -5685,8 +5335,8 @@
         </p:nvSpPr>
         <p:spPr>
           <a:xfrm>
-            <a:off x="238521" y="2965712"/>
-            <a:ext cx="2901764" cy="178676"/>
+            <a:off x="217738" y="3027646"/>
+            <a:ext cx="2895201" cy="178676"/>
           </a:xfrm>
           <a:prstGeom prst="rect">
             <a:avLst/>
@@ -5716,7 +5366,7 @@
           <a:lstStyle/>
           <a:p>
             <a:pPr algn="ctr"/>
-            <a:endParaRPr lang="en-US"/>
+            <a:endParaRPr lang="en-US" sz="1701"/>
           </a:p>
         </p:txBody>
       </p:sp>
@@ -5734,7 +5384,7 @@
         </p:nvSpPr>
         <p:spPr>
           <a:xfrm>
-            <a:off x="827904" y="3319308"/>
+            <a:off x="800558" y="3381242"/>
             <a:ext cx="2885489" cy="178676"/>
           </a:xfrm>
           <a:prstGeom prst="rect">
@@ -5765,7 +5415,7 @@
           <a:lstStyle/>
           <a:p>
             <a:pPr algn="ctr"/>
-            <a:endParaRPr lang="en-US"/>
+            <a:endParaRPr lang="en-US" sz="1701"/>
           </a:p>
         </p:txBody>
       </p:sp>
@@ -5783,7 +5433,7 @@
         </p:nvSpPr>
         <p:spPr>
           <a:xfrm>
-            <a:off x="1409150" y="3669443"/>
+            <a:off x="1381804" y="3731377"/>
             <a:ext cx="2885489" cy="178676"/>
           </a:xfrm>
           <a:prstGeom prst="rect">
@@ -5814,7 +5464,7 @@
           <a:lstStyle/>
           <a:p>
             <a:pPr algn="ctr"/>
-            <a:endParaRPr lang="en-US"/>
+            <a:endParaRPr lang="en-US" sz="1701"/>
           </a:p>
         </p:txBody>
       </p:sp>
@@ -5832,7 +5482,7 @@
         </p:nvSpPr>
         <p:spPr>
           <a:xfrm>
-            <a:off x="1981602" y="4019578"/>
+            <a:off x="1954257" y="4081512"/>
             <a:ext cx="2894283" cy="178676"/>
           </a:xfrm>
           <a:prstGeom prst="rect">
@@ -5863,7 +5513,7 @@
           <a:lstStyle/>
           <a:p>
             <a:pPr algn="ctr"/>
-            <a:endParaRPr lang="en-US"/>
+            <a:endParaRPr lang="en-US" sz="1701"/>
           </a:p>
         </p:txBody>
       </p:sp>
@@ -5881,7 +5531,7 @@
         </p:nvSpPr>
         <p:spPr>
           <a:xfrm>
-            <a:off x="2550163" y="4369713"/>
+            <a:off x="2522818" y="4431647"/>
             <a:ext cx="2906311" cy="178676"/>
           </a:xfrm>
           <a:prstGeom prst="rect">
@@ -5912,7 +5562,7 @@
           <a:lstStyle/>
           <a:p>
             <a:pPr algn="ctr"/>
-            <a:endParaRPr lang="en-US"/>
+            <a:endParaRPr lang="en-US" sz="1701"/>
           </a:p>
         </p:txBody>
       </p:sp>
@@ -5930,7 +5580,7 @@
         </p:nvSpPr>
         <p:spPr>
           <a:xfrm>
-            <a:off x="3132148" y="4719848"/>
+            <a:off x="3104800" y="4781782"/>
             <a:ext cx="2623088" cy="178676"/>
           </a:xfrm>
           <a:prstGeom prst="rect">
@@ -5961,7 +5611,7 @@
           <a:lstStyle/>
           <a:p>
             <a:pPr algn="ctr"/>
-            <a:endParaRPr lang="en-US"/>
+            <a:endParaRPr lang="en-US" sz="1701"/>
           </a:p>
         </p:txBody>
       </p:sp>
@@ -5979,7 +5629,7 @@
         </p:nvSpPr>
         <p:spPr>
           <a:xfrm>
-            <a:off x="3713393" y="2965712"/>
+            <a:off x="3686045" y="3027646"/>
             <a:ext cx="2033704" cy="178676"/>
           </a:xfrm>
           <a:prstGeom prst="rect">
@@ -6016,7 +5666,7 @@
           <a:lstStyle/>
           <a:p>
             <a:pPr algn="ctr"/>
-            <a:endParaRPr lang="en-US"/>
+            <a:endParaRPr lang="en-US" sz="1701"/>
           </a:p>
         </p:txBody>
       </p:sp>
@@ -6034,7 +5684,7 @@
         </p:nvSpPr>
         <p:spPr>
           <a:xfrm>
-            <a:off x="4291606" y="3319308"/>
+            <a:off x="4264261" y="3381242"/>
             <a:ext cx="1455491" cy="178676"/>
           </a:xfrm>
           <a:prstGeom prst="rect">
@@ -6071,7 +5721,7 @@
           <a:lstStyle/>
           <a:p>
             <a:pPr algn="ctr"/>
-            <a:endParaRPr lang="en-US"/>
+            <a:endParaRPr lang="en-US" sz="1701"/>
           </a:p>
         </p:txBody>
       </p:sp>
@@ -6089,7 +5739,7 @@
         </p:nvSpPr>
         <p:spPr>
           <a:xfrm>
-            <a:off x="4877460" y="3665982"/>
+            <a:off x="4850115" y="3727916"/>
             <a:ext cx="869637" cy="178676"/>
           </a:xfrm>
           <a:prstGeom prst="rect">
@@ -6126,7 +5776,7 @@
           <a:lstStyle/>
           <a:p>
             <a:pPr algn="ctr"/>
-            <a:endParaRPr lang="en-US"/>
+            <a:endParaRPr lang="en-US" sz="1701"/>
           </a:p>
         </p:txBody>
       </p:sp>
@@ -6144,7 +5794,7 @@
         </p:nvSpPr>
         <p:spPr>
           <a:xfrm>
-            <a:off x="5456474" y="4019578"/>
+            <a:off x="5429129" y="4081512"/>
             <a:ext cx="290623" cy="178676"/>
           </a:xfrm>
           <a:prstGeom prst="rect">
@@ -6181,7 +5831,7 @@
           <a:lstStyle/>
           <a:p>
             <a:pPr algn="ctr"/>
-            <a:endParaRPr lang="en-US"/>
+            <a:endParaRPr lang="en-US" sz="1701"/>
           </a:p>
         </p:txBody>
       </p:sp>
@@ -6199,8 +5849,8 @@
         </p:nvSpPr>
         <p:spPr>
           <a:xfrm>
-            <a:off x="246658" y="3663144"/>
-            <a:ext cx="592902" cy="178676"/>
+            <a:off x="219314" y="3725078"/>
+            <a:ext cx="592901" cy="178676"/>
           </a:xfrm>
           <a:prstGeom prst="rect">
             <a:avLst/>
@@ -6236,7 +5886,7 @@
           <a:lstStyle/>
           <a:p>
             <a:pPr algn="ctr"/>
-            <a:endParaRPr lang="en-US"/>
+            <a:endParaRPr lang="en-US" sz="1701"/>
           </a:p>
         </p:txBody>
       </p:sp>
@@ -6254,7 +5904,7 @@
         </p:nvSpPr>
         <p:spPr>
           <a:xfrm>
-            <a:off x="246658" y="4019578"/>
+            <a:off x="219313" y="4081512"/>
             <a:ext cx="1163231" cy="178676"/>
           </a:xfrm>
           <a:prstGeom prst="rect">
@@ -6291,7 +5941,7 @@
           <a:lstStyle/>
           <a:p>
             <a:pPr algn="ctr"/>
-            <a:endParaRPr lang="en-US"/>
+            <a:endParaRPr lang="en-US" sz="1701"/>
           </a:p>
         </p:txBody>
       </p:sp>
@@ -6309,7 +5959,7 @@
         </p:nvSpPr>
         <p:spPr>
           <a:xfrm>
-            <a:off x="246659" y="4369713"/>
+            <a:off x="219311" y="4431647"/>
             <a:ext cx="1748490" cy="178676"/>
           </a:xfrm>
           <a:prstGeom prst="rect">
@@ -6346,7 +5996,7 @@
           <a:lstStyle/>
           <a:p>
             <a:pPr algn="ctr"/>
-            <a:endParaRPr lang="en-US"/>
+            <a:endParaRPr lang="en-US" sz="1701"/>
           </a:p>
         </p:txBody>
       </p:sp>
@@ -6364,7 +6014,7 @@
         </p:nvSpPr>
         <p:spPr>
           <a:xfrm>
-            <a:off x="246657" y="4713549"/>
+            <a:off x="219312" y="4775483"/>
             <a:ext cx="2303505" cy="178676"/>
           </a:xfrm>
           <a:prstGeom prst="rect">
@@ -6401,7 +6051,1126 @@
           <a:lstStyle/>
           <a:p>
             <a:pPr algn="ctr"/>
-            <a:endParaRPr lang="en-US"/>
+            <a:endParaRPr lang="en-US" sz="1701"/>
+          </a:p>
+        </p:txBody>
+      </p:sp>
+      <p:sp>
+        <p:nvSpPr>
+          <p:cNvPr id="74" name="Rectangle 73">
+            <a:extLst>
+              <a:ext uri="{FF2B5EF4-FFF2-40B4-BE49-F238E27FC236}">
+                <a16:creationId xmlns:a16="http://schemas.microsoft.com/office/drawing/2014/main" id="{BED1B0A3-BF65-C64B-9DFE-56F1F5235F91}"/>
+              </a:ext>
+            </a:extLst>
+          </p:cNvPr>
+          <p:cNvSpPr/>
+          <p:nvPr/>
+        </p:nvSpPr>
+        <p:spPr>
+          <a:xfrm>
+            <a:off x="219311" y="1183930"/>
+            <a:ext cx="868044" cy="177924"/>
+          </a:xfrm>
+          <a:prstGeom prst="rect">
+            <a:avLst/>
+          </a:prstGeom>
+          <a:solidFill>
+            <a:schemeClr val="accent1">
+              <a:lumMod val="50000"/>
+            </a:schemeClr>
+          </a:solidFill>
+          <a:ln>
+            <a:noFill/>
+          </a:ln>
+        </p:spPr>
+        <p:style>
+          <a:lnRef idx="2">
+            <a:schemeClr val="accent1">
+              <a:shade val="50000"/>
+            </a:schemeClr>
+          </a:lnRef>
+          <a:fillRef idx="1">
+            <a:schemeClr val="accent1"/>
+          </a:fillRef>
+          <a:effectRef idx="0">
+            <a:schemeClr val="accent1"/>
+          </a:effectRef>
+          <a:fontRef idx="minor">
+            <a:schemeClr val="lt1"/>
+          </a:fontRef>
+        </p:style>
+        <p:txBody>
+          <a:bodyPr rtlCol="0" anchor="ctr"/>
+          <a:lstStyle/>
+          <a:p>
+            <a:pPr algn="ctr"/>
+            <a:endParaRPr lang="en-US" sz="1701"/>
+          </a:p>
+        </p:txBody>
+      </p:sp>
+      <p:sp>
+        <p:nvSpPr>
+          <p:cNvPr id="75" name="Rectangle 74">
+            <a:extLst>
+              <a:ext uri="{FF2B5EF4-FFF2-40B4-BE49-F238E27FC236}">
+                <a16:creationId xmlns:a16="http://schemas.microsoft.com/office/drawing/2014/main" id="{543A7AD8-B20E-FF49-88A8-280F11CA8CF4}"/>
+              </a:ext>
+            </a:extLst>
+          </p:cNvPr>
+          <p:cNvSpPr/>
+          <p:nvPr/>
+        </p:nvSpPr>
+        <p:spPr>
+          <a:xfrm>
+            <a:off x="1086914" y="1536774"/>
+            <a:ext cx="870295" cy="178676"/>
+          </a:xfrm>
+          <a:prstGeom prst="rect">
+            <a:avLst/>
+          </a:prstGeom>
+          <a:solidFill>
+            <a:schemeClr val="accent1">
+              <a:lumMod val="50000"/>
+            </a:schemeClr>
+          </a:solidFill>
+          <a:ln>
+            <a:noFill/>
+          </a:ln>
+        </p:spPr>
+        <p:style>
+          <a:lnRef idx="2">
+            <a:schemeClr val="accent1">
+              <a:shade val="50000"/>
+            </a:schemeClr>
+          </a:lnRef>
+          <a:fillRef idx="1">
+            <a:schemeClr val="accent1"/>
+          </a:fillRef>
+          <a:effectRef idx="0">
+            <a:schemeClr val="accent1"/>
+          </a:effectRef>
+          <a:fontRef idx="minor">
+            <a:schemeClr val="lt1"/>
+          </a:fontRef>
+        </p:style>
+        <p:txBody>
+          <a:bodyPr rtlCol="0" anchor="ctr"/>
+          <a:lstStyle/>
+          <a:p>
+            <a:pPr algn="ctr"/>
+            <a:endParaRPr lang="en-US" sz="1701"/>
+          </a:p>
+        </p:txBody>
+      </p:sp>
+      <p:sp>
+        <p:nvSpPr>
+          <p:cNvPr id="82" name="Rectangle 81">
+            <a:extLst>
+              <a:ext uri="{FF2B5EF4-FFF2-40B4-BE49-F238E27FC236}">
+                <a16:creationId xmlns:a16="http://schemas.microsoft.com/office/drawing/2014/main" id="{F1DAD4C3-4087-1A49-AD9C-15E2116FAC28}"/>
+              </a:ext>
+            </a:extLst>
+          </p:cNvPr>
+          <p:cNvSpPr/>
+          <p:nvPr/>
+        </p:nvSpPr>
+        <p:spPr>
+          <a:xfrm>
+            <a:off x="1960244" y="1889998"/>
+            <a:ext cx="855511" cy="176048"/>
+          </a:xfrm>
+          <a:prstGeom prst="rect">
+            <a:avLst/>
+          </a:prstGeom>
+          <a:solidFill>
+            <a:schemeClr val="accent1">
+              <a:lumMod val="50000"/>
+            </a:schemeClr>
+          </a:solidFill>
+          <a:ln>
+            <a:noFill/>
+          </a:ln>
+        </p:spPr>
+        <p:style>
+          <a:lnRef idx="2">
+            <a:schemeClr val="accent1">
+              <a:shade val="50000"/>
+            </a:schemeClr>
+          </a:lnRef>
+          <a:fillRef idx="1">
+            <a:schemeClr val="accent1"/>
+          </a:fillRef>
+          <a:effectRef idx="0">
+            <a:schemeClr val="accent1"/>
+          </a:effectRef>
+          <a:fontRef idx="minor">
+            <a:schemeClr val="lt1"/>
+          </a:fontRef>
+        </p:style>
+        <p:txBody>
+          <a:bodyPr rtlCol="0" anchor="ctr"/>
+          <a:lstStyle/>
+          <a:p>
+            <a:pPr algn="ctr"/>
+            <a:endParaRPr lang="en-US" sz="1701"/>
+          </a:p>
+        </p:txBody>
+      </p:sp>
+      <p:sp>
+        <p:nvSpPr>
+          <p:cNvPr id="83" name="Rectangle 82">
+            <a:extLst>
+              <a:ext uri="{FF2B5EF4-FFF2-40B4-BE49-F238E27FC236}">
+                <a16:creationId xmlns:a16="http://schemas.microsoft.com/office/drawing/2014/main" id="{A09527A5-4CF3-0F4B-883F-31D1AF79E663}"/>
+              </a:ext>
+            </a:extLst>
+          </p:cNvPr>
+          <p:cNvSpPr/>
+          <p:nvPr/>
+        </p:nvSpPr>
+        <p:spPr>
+          <a:xfrm>
+            <a:off x="2814179" y="2278596"/>
+            <a:ext cx="870295" cy="171685"/>
+          </a:xfrm>
+          <a:prstGeom prst="rect">
+            <a:avLst/>
+          </a:prstGeom>
+          <a:solidFill>
+            <a:schemeClr val="accent1">
+              <a:lumMod val="50000"/>
+            </a:schemeClr>
+          </a:solidFill>
+          <a:ln>
+            <a:noFill/>
+          </a:ln>
+        </p:spPr>
+        <p:style>
+          <a:lnRef idx="2">
+            <a:schemeClr val="accent1">
+              <a:shade val="50000"/>
+            </a:schemeClr>
+          </a:lnRef>
+          <a:fillRef idx="1">
+            <a:schemeClr val="accent1"/>
+          </a:fillRef>
+          <a:effectRef idx="0">
+            <a:schemeClr val="accent1"/>
+          </a:effectRef>
+          <a:fontRef idx="minor">
+            <a:schemeClr val="lt1"/>
+          </a:fontRef>
+        </p:style>
+        <p:txBody>
+          <a:bodyPr rtlCol="0" anchor="ctr"/>
+          <a:lstStyle/>
+          <a:p>
+            <a:pPr algn="ctr"/>
+            <a:endParaRPr lang="en-US" sz="1701"/>
+          </a:p>
+        </p:txBody>
+      </p:sp>
+      <p:sp>
+        <p:nvSpPr>
+          <p:cNvPr id="84" name="Rectangle 83">
+            <a:extLst>
+              <a:ext uri="{FF2B5EF4-FFF2-40B4-BE49-F238E27FC236}">
+                <a16:creationId xmlns:a16="http://schemas.microsoft.com/office/drawing/2014/main" id="{244EF464-A0E4-F949-8BC3-01484A06584A}"/>
+              </a:ext>
+            </a:extLst>
+          </p:cNvPr>
+          <p:cNvSpPr/>
+          <p:nvPr/>
+        </p:nvSpPr>
+        <p:spPr>
+          <a:xfrm>
+            <a:off x="216164" y="3027646"/>
+            <a:ext cx="871193" cy="178676"/>
+          </a:xfrm>
+          <a:prstGeom prst="rect">
+            <a:avLst/>
+          </a:prstGeom>
+          <a:solidFill>
+            <a:schemeClr val="accent1">
+              <a:lumMod val="50000"/>
+            </a:schemeClr>
+          </a:solidFill>
+          <a:ln>
+            <a:noFill/>
+          </a:ln>
+        </p:spPr>
+        <p:style>
+          <a:lnRef idx="2">
+            <a:schemeClr val="accent1">
+              <a:shade val="50000"/>
+            </a:schemeClr>
+          </a:lnRef>
+          <a:fillRef idx="1">
+            <a:schemeClr val="accent1"/>
+          </a:fillRef>
+          <a:effectRef idx="0">
+            <a:schemeClr val="accent1"/>
+          </a:effectRef>
+          <a:fontRef idx="minor">
+            <a:schemeClr val="lt1"/>
+          </a:fontRef>
+        </p:style>
+        <p:txBody>
+          <a:bodyPr rtlCol="0" anchor="ctr"/>
+          <a:lstStyle/>
+          <a:p>
+            <a:pPr algn="ctr"/>
+            <a:endParaRPr lang="en-US" sz="1701"/>
+          </a:p>
+        </p:txBody>
+      </p:sp>
+      <p:sp>
+        <p:nvSpPr>
+          <p:cNvPr id="85" name="Rectangle 84">
+            <a:extLst>
+              <a:ext uri="{FF2B5EF4-FFF2-40B4-BE49-F238E27FC236}">
+                <a16:creationId xmlns:a16="http://schemas.microsoft.com/office/drawing/2014/main" id="{9E70EFD6-AE19-A64D-B2B4-781EB85AB0C9}"/>
+              </a:ext>
+            </a:extLst>
+          </p:cNvPr>
+          <p:cNvSpPr/>
+          <p:nvPr/>
+        </p:nvSpPr>
+        <p:spPr>
+          <a:xfrm>
+            <a:off x="798195" y="3386592"/>
+            <a:ext cx="870295" cy="170178"/>
+          </a:xfrm>
+          <a:prstGeom prst="rect">
+            <a:avLst/>
+          </a:prstGeom>
+          <a:solidFill>
+            <a:schemeClr val="accent1">
+              <a:lumMod val="50000"/>
+            </a:schemeClr>
+          </a:solidFill>
+          <a:ln>
+            <a:noFill/>
+          </a:ln>
+        </p:spPr>
+        <p:style>
+          <a:lnRef idx="2">
+            <a:schemeClr val="accent1">
+              <a:shade val="50000"/>
+            </a:schemeClr>
+          </a:lnRef>
+          <a:fillRef idx="1">
+            <a:schemeClr val="accent1"/>
+          </a:fillRef>
+          <a:effectRef idx="0">
+            <a:schemeClr val="accent1"/>
+          </a:effectRef>
+          <a:fontRef idx="minor">
+            <a:schemeClr val="lt1"/>
+          </a:fontRef>
+        </p:style>
+        <p:txBody>
+          <a:bodyPr rtlCol="0" anchor="ctr"/>
+          <a:lstStyle/>
+          <a:p>
+            <a:pPr algn="ctr"/>
+            <a:endParaRPr lang="en-US" sz="1701"/>
+          </a:p>
+        </p:txBody>
+      </p:sp>
+      <p:sp>
+        <p:nvSpPr>
+          <p:cNvPr id="86" name="Rectangle 85">
+            <a:extLst>
+              <a:ext uri="{FF2B5EF4-FFF2-40B4-BE49-F238E27FC236}">
+                <a16:creationId xmlns:a16="http://schemas.microsoft.com/office/drawing/2014/main" id="{34AAAB4F-9F98-A24E-89A8-74D41E42F596}"/>
+              </a:ext>
+            </a:extLst>
+          </p:cNvPr>
+          <p:cNvSpPr/>
+          <p:nvPr/>
+        </p:nvSpPr>
+        <p:spPr>
+          <a:xfrm>
+            <a:off x="1380674" y="3731689"/>
+            <a:ext cx="870295" cy="175460"/>
+          </a:xfrm>
+          <a:prstGeom prst="rect">
+            <a:avLst/>
+          </a:prstGeom>
+          <a:solidFill>
+            <a:schemeClr val="accent1">
+              <a:lumMod val="50000"/>
+            </a:schemeClr>
+          </a:solidFill>
+          <a:ln>
+            <a:noFill/>
+          </a:ln>
+        </p:spPr>
+        <p:style>
+          <a:lnRef idx="2">
+            <a:schemeClr val="accent1">
+              <a:shade val="50000"/>
+            </a:schemeClr>
+          </a:lnRef>
+          <a:fillRef idx="1">
+            <a:schemeClr val="accent1"/>
+          </a:fillRef>
+          <a:effectRef idx="0">
+            <a:schemeClr val="accent1"/>
+          </a:effectRef>
+          <a:fontRef idx="minor">
+            <a:schemeClr val="lt1"/>
+          </a:fontRef>
+        </p:style>
+        <p:txBody>
+          <a:bodyPr rtlCol="0" anchor="ctr"/>
+          <a:lstStyle/>
+          <a:p>
+            <a:pPr algn="ctr"/>
+            <a:endParaRPr lang="en-US" sz="1701"/>
+          </a:p>
+        </p:txBody>
+      </p:sp>
+      <p:sp>
+        <p:nvSpPr>
+          <p:cNvPr id="87" name="Rectangle 86">
+            <a:extLst>
+              <a:ext uri="{FF2B5EF4-FFF2-40B4-BE49-F238E27FC236}">
+                <a16:creationId xmlns:a16="http://schemas.microsoft.com/office/drawing/2014/main" id="{494DFD14-7FD8-EE4D-9E8A-0D913F9BBFBB}"/>
+              </a:ext>
+            </a:extLst>
+          </p:cNvPr>
+          <p:cNvSpPr/>
+          <p:nvPr/>
+        </p:nvSpPr>
+        <p:spPr>
+          <a:xfrm>
+            <a:off x="1951558" y="4081512"/>
+            <a:ext cx="862618" cy="178676"/>
+          </a:xfrm>
+          <a:prstGeom prst="rect">
+            <a:avLst/>
+          </a:prstGeom>
+          <a:solidFill>
+            <a:schemeClr val="accent1">
+              <a:lumMod val="50000"/>
+            </a:schemeClr>
+          </a:solidFill>
+          <a:ln>
+            <a:noFill/>
+          </a:ln>
+        </p:spPr>
+        <p:style>
+          <a:lnRef idx="2">
+            <a:schemeClr val="accent1">
+              <a:shade val="50000"/>
+            </a:schemeClr>
+          </a:lnRef>
+          <a:fillRef idx="1">
+            <a:schemeClr val="accent1"/>
+          </a:fillRef>
+          <a:effectRef idx="0">
+            <a:schemeClr val="accent1"/>
+          </a:effectRef>
+          <a:fontRef idx="minor">
+            <a:schemeClr val="lt1"/>
+          </a:fontRef>
+        </p:style>
+        <p:txBody>
+          <a:bodyPr rtlCol="0" anchor="ctr"/>
+          <a:lstStyle/>
+          <a:p>
+            <a:pPr algn="ctr"/>
+            <a:endParaRPr lang="en-US" sz="1701"/>
+          </a:p>
+        </p:txBody>
+      </p:sp>
+      <p:sp>
+        <p:nvSpPr>
+          <p:cNvPr id="88" name="Rectangle 87">
+            <a:extLst>
+              <a:ext uri="{FF2B5EF4-FFF2-40B4-BE49-F238E27FC236}">
+                <a16:creationId xmlns:a16="http://schemas.microsoft.com/office/drawing/2014/main" id="{A28B2977-F98A-6047-938A-6B3754B53F07}"/>
+              </a:ext>
+            </a:extLst>
+          </p:cNvPr>
+          <p:cNvSpPr/>
+          <p:nvPr/>
+        </p:nvSpPr>
+        <p:spPr>
+          <a:xfrm>
+            <a:off x="2522140" y="4435109"/>
+            <a:ext cx="873285" cy="175214"/>
+          </a:xfrm>
+          <a:prstGeom prst="rect">
+            <a:avLst/>
+          </a:prstGeom>
+          <a:solidFill>
+            <a:schemeClr val="accent1">
+              <a:lumMod val="50000"/>
+            </a:schemeClr>
+          </a:solidFill>
+          <a:ln>
+            <a:noFill/>
+          </a:ln>
+        </p:spPr>
+        <p:style>
+          <a:lnRef idx="2">
+            <a:schemeClr val="accent1">
+              <a:shade val="50000"/>
+            </a:schemeClr>
+          </a:lnRef>
+          <a:fillRef idx="1">
+            <a:schemeClr val="accent1"/>
+          </a:fillRef>
+          <a:effectRef idx="0">
+            <a:schemeClr val="accent1"/>
+          </a:effectRef>
+          <a:fontRef idx="minor">
+            <a:schemeClr val="lt1"/>
+          </a:fontRef>
+        </p:style>
+        <p:txBody>
+          <a:bodyPr rtlCol="0" anchor="ctr"/>
+          <a:lstStyle/>
+          <a:p>
+            <a:pPr algn="ctr"/>
+            <a:endParaRPr lang="en-US" sz="1701"/>
+          </a:p>
+        </p:txBody>
+      </p:sp>
+      <p:sp>
+        <p:nvSpPr>
+          <p:cNvPr id="89" name="Rectangle 88">
+            <a:extLst>
+              <a:ext uri="{FF2B5EF4-FFF2-40B4-BE49-F238E27FC236}">
+                <a16:creationId xmlns:a16="http://schemas.microsoft.com/office/drawing/2014/main" id="{EC3D90CE-62C6-CE46-BB9F-0BEE68B4E038}"/>
+              </a:ext>
+            </a:extLst>
+          </p:cNvPr>
+          <p:cNvSpPr/>
+          <p:nvPr/>
+        </p:nvSpPr>
+        <p:spPr>
+          <a:xfrm>
+            <a:off x="3098238" y="4782749"/>
+            <a:ext cx="878433" cy="178676"/>
+          </a:xfrm>
+          <a:prstGeom prst="rect">
+            <a:avLst/>
+          </a:prstGeom>
+          <a:solidFill>
+            <a:schemeClr val="accent1">
+              <a:lumMod val="50000"/>
+            </a:schemeClr>
+          </a:solidFill>
+          <a:ln>
+            <a:noFill/>
+          </a:ln>
+        </p:spPr>
+        <p:style>
+          <a:lnRef idx="2">
+            <a:schemeClr val="accent1">
+              <a:shade val="50000"/>
+            </a:schemeClr>
+          </a:lnRef>
+          <a:fillRef idx="1">
+            <a:schemeClr val="accent1"/>
+          </a:fillRef>
+          <a:effectRef idx="0">
+            <a:schemeClr val="accent1"/>
+          </a:effectRef>
+          <a:fontRef idx="minor">
+            <a:schemeClr val="lt1"/>
+          </a:fontRef>
+        </p:style>
+        <p:txBody>
+          <a:bodyPr rtlCol="0" anchor="ctr"/>
+          <a:lstStyle/>
+          <a:p>
+            <a:pPr algn="ctr"/>
+            <a:endParaRPr lang="en-US" sz="1701"/>
+          </a:p>
+        </p:txBody>
+      </p:sp>
+      <p:sp>
+        <p:nvSpPr>
+          <p:cNvPr id="90" name="Rectangle 89">
+            <a:extLst>
+              <a:ext uri="{FF2B5EF4-FFF2-40B4-BE49-F238E27FC236}">
+                <a16:creationId xmlns:a16="http://schemas.microsoft.com/office/drawing/2014/main" id="{D37D2CD9-31BA-E64C-93D9-DBBAFF337C43}"/>
+              </a:ext>
+            </a:extLst>
+          </p:cNvPr>
+          <p:cNvSpPr/>
+          <p:nvPr/>
+        </p:nvSpPr>
+        <p:spPr>
+          <a:xfrm>
+            <a:off x="1086574" y="1183929"/>
+            <a:ext cx="203704" cy="177924"/>
+          </a:xfrm>
+          <a:prstGeom prst="rect">
+            <a:avLst/>
+          </a:prstGeom>
+          <a:pattFill prst="wdDnDiag">
+            <a:fgClr>
+              <a:schemeClr val="accent1">
+                <a:lumMod val="50000"/>
+              </a:schemeClr>
+            </a:fgClr>
+            <a:bgClr>
+              <a:schemeClr val="accent1"/>
+            </a:bgClr>
+          </a:pattFill>
+          <a:ln>
+            <a:noFill/>
+          </a:ln>
+        </p:spPr>
+        <p:style>
+          <a:lnRef idx="2">
+            <a:schemeClr val="accent1">
+              <a:shade val="50000"/>
+            </a:schemeClr>
+          </a:lnRef>
+          <a:fillRef idx="1">
+            <a:schemeClr val="accent1"/>
+          </a:fillRef>
+          <a:effectRef idx="0">
+            <a:schemeClr val="accent1"/>
+          </a:effectRef>
+          <a:fontRef idx="minor">
+            <a:schemeClr val="lt1"/>
+          </a:fontRef>
+        </p:style>
+        <p:txBody>
+          <a:bodyPr rtlCol="0" anchor="ctr"/>
+          <a:lstStyle/>
+          <a:p>
+            <a:pPr algn="ctr"/>
+            <a:endParaRPr lang="en-US" sz="1701"/>
+          </a:p>
+        </p:txBody>
+      </p:sp>
+      <p:sp>
+        <p:nvSpPr>
+          <p:cNvPr id="91" name="Rectangle 90">
+            <a:extLst>
+              <a:ext uri="{FF2B5EF4-FFF2-40B4-BE49-F238E27FC236}">
+                <a16:creationId xmlns:a16="http://schemas.microsoft.com/office/drawing/2014/main" id="{7AD6C748-6B7C-1E4A-99F5-AC40AAAF516A}"/>
+              </a:ext>
+            </a:extLst>
+          </p:cNvPr>
+          <p:cNvSpPr/>
+          <p:nvPr/>
+        </p:nvSpPr>
+        <p:spPr>
+          <a:xfrm>
+            <a:off x="1958193" y="1535652"/>
+            <a:ext cx="203704" cy="177924"/>
+          </a:xfrm>
+          <a:prstGeom prst="rect">
+            <a:avLst/>
+          </a:prstGeom>
+          <a:pattFill prst="wdDnDiag">
+            <a:fgClr>
+              <a:schemeClr val="accent1">
+                <a:lumMod val="50000"/>
+              </a:schemeClr>
+            </a:fgClr>
+            <a:bgClr>
+              <a:schemeClr val="accent1"/>
+            </a:bgClr>
+          </a:pattFill>
+          <a:ln>
+            <a:noFill/>
+          </a:ln>
+        </p:spPr>
+        <p:style>
+          <a:lnRef idx="2">
+            <a:schemeClr val="accent1">
+              <a:shade val="50000"/>
+            </a:schemeClr>
+          </a:lnRef>
+          <a:fillRef idx="1">
+            <a:schemeClr val="accent1"/>
+          </a:fillRef>
+          <a:effectRef idx="0">
+            <a:schemeClr val="accent1"/>
+          </a:effectRef>
+          <a:fontRef idx="minor">
+            <a:schemeClr val="lt1"/>
+          </a:fontRef>
+        </p:style>
+        <p:txBody>
+          <a:bodyPr rtlCol="0" anchor="ctr"/>
+          <a:lstStyle/>
+          <a:p>
+            <a:pPr algn="ctr"/>
+            <a:endParaRPr lang="en-US" sz="1701"/>
+          </a:p>
+        </p:txBody>
+      </p:sp>
+      <p:sp>
+        <p:nvSpPr>
+          <p:cNvPr id="92" name="Rectangle 91">
+            <a:extLst>
+              <a:ext uri="{FF2B5EF4-FFF2-40B4-BE49-F238E27FC236}">
+                <a16:creationId xmlns:a16="http://schemas.microsoft.com/office/drawing/2014/main" id="{E3D65764-139F-5048-80CA-F0307BA265F3}"/>
+              </a:ext>
+            </a:extLst>
+          </p:cNvPr>
+          <p:cNvSpPr/>
+          <p:nvPr/>
+        </p:nvSpPr>
+        <p:spPr>
+          <a:xfrm>
+            <a:off x="2810851" y="1885496"/>
+            <a:ext cx="203704" cy="177924"/>
+          </a:xfrm>
+          <a:prstGeom prst="rect">
+            <a:avLst/>
+          </a:prstGeom>
+          <a:pattFill prst="wdDnDiag">
+            <a:fgClr>
+              <a:schemeClr val="accent1">
+                <a:lumMod val="50000"/>
+              </a:schemeClr>
+            </a:fgClr>
+            <a:bgClr>
+              <a:schemeClr val="accent1"/>
+            </a:bgClr>
+          </a:pattFill>
+          <a:ln>
+            <a:noFill/>
+          </a:ln>
+        </p:spPr>
+        <p:style>
+          <a:lnRef idx="2">
+            <a:schemeClr val="accent1">
+              <a:shade val="50000"/>
+            </a:schemeClr>
+          </a:lnRef>
+          <a:fillRef idx="1">
+            <a:schemeClr val="accent1"/>
+          </a:fillRef>
+          <a:effectRef idx="0">
+            <a:schemeClr val="accent1"/>
+          </a:effectRef>
+          <a:fontRef idx="minor">
+            <a:schemeClr val="lt1"/>
+          </a:fontRef>
+        </p:style>
+        <p:txBody>
+          <a:bodyPr rtlCol="0" anchor="ctr"/>
+          <a:lstStyle/>
+          <a:p>
+            <a:pPr algn="ctr"/>
+            <a:endParaRPr lang="en-US" sz="1701"/>
+          </a:p>
+        </p:txBody>
+      </p:sp>
+      <p:sp>
+        <p:nvSpPr>
+          <p:cNvPr id="93" name="Rectangle 92">
+            <a:extLst>
+              <a:ext uri="{FF2B5EF4-FFF2-40B4-BE49-F238E27FC236}">
+                <a16:creationId xmlns:a16="http://schemas.microsoft.com/office/drawing/2014/main" id="{0F977B6A-E772-B440-A920-7DE3A0BDADC1}"/>
+              </a:ext>
+            </a:extLst>
+          </p:cNvPr>
+          <p:cNvSpPr/>
+          <p:nvPr/>
+        </p:nvSpPr>
+        <p:spPr>
+          <a:xfrm>
+            <a:off x="3683767" y="2279346"/>
+            <a:ext cx="203704" cy="170932"/>
+          </a:xfrm>
+          <a:prstGeom prst="rect">
+            <a:avLst/>
+          </a:prstGeom>
+          <a:pattFill prst="wdDnDiag">
+            <a:fgClr>
+              <a:schemeClr val="accent1">
+                <a:lumMod val="50000"/>
+              </a:schemeClr>
+            </a:fgClr>
+            <a:bgClr>
+              <a:schemeClr val="accent1"/>
+            </a:bgClr>
+          </a:pattFill>
+          <a:ln>
+            <a:noFill/>
+          </a:ln>
+        </p:spPr>
+        <p:style>
+          <a:lnRef idx="2">
+            <a:schemeClr val="accent1">
+              <a:shade val="50000"/>
+            </a:schemeClr>
+          </a:lnRef>
+          <a:fillRef idx="1">
+            <a:schemeClr val="accent1"/>
+          </a:fillRef>
+          <a:effectRef idx="0">
+            <a:schemeClr val="accent1"/>
+          </a:effectRef>
+          <a:fontRef idx="minor">
+            <a:schemeClr val="lt1"/>
+          </a:fontRef>
+        </p:style>
+        <p:txBody>
+          <a:bodyPr rtlCol="0" anchor="ctr"/>
+          <a:lstStyle/>
+          <a:p>
+            <a:pPr algn="ctr"/>
+            <a:endParaRPr lang="en-US" sz="1701"/>
+          </a:p>
+        </p:txBody>
+      </p:sp>
+      <p:sp>
+        <p:nvSpPr>
+          <p:cNvPr id="2" name="TextBox 1">
+            <a:extLst>
+              <a:ext uri="{FF2B5EF4-FFF2-40B4-BE49-F238E27FC236}">
+                <a16:creationId xmlns:a16="http://schemas.microsoft.com/office/drawing/2014/main" id="{7A7BB639-5183-AC49-95AD-604F90D6BDCE}"/>
+              </a:ext>
+            </a:extLst>
+          </p:cNvPr>
+          <p:cNvSpPr txBox="1"/>
+          <p:nvPr/>
+        </p:nvSpPr>
+        <p:spPr>
+          <a:xfrm>
+            <a:off x="998157" y="872730"/>
+            <a:ext cx="3951718" cy="307777"/>
+          </a:xfrm>
+          <a:prstGeom prst="rect">
+            <a:avLst/>
+          </a:prstGeom>
+          <a:solidFill>
+            <a:schemeClr val="bg1"/>
+          </a:solidFill>
+        </p:spPr>
+        <p:txBody>
+          <a:bodyPr wrap="square" rtlCol="0">
+            <a:spAutoFit/>
+          </a:bodyPr>
+          <a:lstStyle/>
+          <a:p>
+            <a:pPr algn="ctr"/>
+            <a:r>
+              <a:rPr lang="en-US" sz="1400" dirty="0"/>
+              <a:t>Release overlap with the 18-month release cadence</a:t>
+            </a:r>
+          </a:p>
+        </p:txBody>
+      </p:sp>
+      <p:sp>
+        <p:nvSpPr>
+          <p:cNvPr id="94" name="TextBox 93">
+            <a:extLst>
+              <a:ext uri="{FF2B5EF4-FFF2-40B4-BE49-F238E27FC236}">
+                <a16:creationId xmlns:a16="http://schemas.microsoft.com/office/drawing/2014/main" id="{488988CF-E70A-E14E-BC38-DDE8C3CFEFB8}"/>
+              </a:ext>
+            </a:extLst>
+          </p:cNvPr>
+          <p:cNvSpPr txBox="1"/>
+          <p:nvPr/>
+        </p:nvSpPr>
+        <p:spPr>
+          <a:xfrm>
+            <a:off x="963714" y="2709489"/>
+            <a:ext cx="4000346" cy="307777"/>
+          </a:xfrm>
+          <a:prstGeom prst="rect">
+            <a:avLst/>
+          </a:prstGeom>
+          <a:solidFill>
+            <a:schemeClr val="bg1"/>
+          </a:solidFill>
+        </p:spPr>
+        <p:txBody>
+          <a:bodyPr wrap="square" rtlCol="0">
+            <a:spAutoFit/>
+          </a:bodyPr>
+          <a:lstStyle/>
+          <a:p>
+            <a:pPr algn="ctr"/>
+            <a:r>
+              <a:rPr lang="en-US" sz="1400" dirty="0"/>
+              <a:t>Release overlap with the 12-month release cadence</a:t>
+            </a:r>
+          </a:p>
+        </p:txBody>
+      </p:sp>
+      <p:sp>
+        <p:nvSpPr>
+          <p:cNvPr id="105" name="Rectangle 104">
+            <a:extLst>
+              <a:ext uri="{FF2B5EF4-FFF2-40B4-BE49-F238E27FC236}">
+                <a16:creationId xmlns:a16="http://schemas.microsoft.com/office/drawing/2014/main" id="{76BFF525-B19F-9E4C-BEBF-7F4F9C1990C6}"/>
+              </a:ext>
+            </a:extLst>
+          </p:cNvPr>
+          <p:cNvSpPr/>
+          <p:nvPr/>
+        </p:nvSpPr>
+        <p:spPr>
+          <a:xfrm>
+            <a:off x="217118" y="5499597"/>
+            <a:ext cx="200330" cy="178676"/>
+          </a:xfrm>
+          <a:prstGeom prst="rect">
+            <a:avLst/>
+          </a:prstGeom>
+          <a:solidFill>
+            <a:schemeClr val="accent1">
+              <a:lumMod val="50000"/>
+            </a:schemeClr>
+          </a:solidFill>
+          <a:ln>
+            <a:noFill/>
+          </a:ln>
+        </p:spPr>
+        <p:style>
+          <a:lnRef idx="2">
+            <a:schemeClr val="accent1">
+              <a:shade val="50000"/>
+            </a:schemeClr>
+          </a:lnRef>
+          <a:fillRef idx="1">
+            <a:schemeClr val="accent1"/>
+          </a:fillRef>
+          <a:effectRef idx="0">
+            <a:schemeClr val="accent1"/>
+          </a:effectRef>
+          <a:fontRef idx="minor">
+            <a:schemeClr val="lt1"/>
+          </a:fontRef>
+        </p:style>
+        <p:txBody>
+          <a:bodyPr rtlCol="0" anchor="ctr"/>
+          <a:lstStyle/>
+          <a:p>
+            <a:pPr algn="ctr"/>
+            <a:endParaRPr lang="en-US" sz="1701"/>
+          </a:p>
+        </p:txBody>
+      </p:sp>
+      <p:sp>
+        <p:nvSpPr>
+          <p:cNvPr id="106" name="Rectangle 105">
+            <a:extLst>
+              <a:ext uri="{FF2B5EF4-FFF2-40B4-BE49-F238E27FC236}">
+                <a16:creationId xmlns:a16="http://schemas.microsoft.com/office/drawing/2014/main" id="{3B077036-437C-9E4B-A833-7802857F5643}"/>
+              </a:ext>
+            </a:extLst>
+          </p:cNvPr>
+          <p:cNvSpPr/>
+          <p:nvPr/>
+        </p:nvSpPr>
+        <p:spPr>
+          <a:xfrm>
+            <a:off x="213746" y="5801495"/>
+            <a:ext cx="199381" cy="178676"/>
+          </a:xfrm>
+          <a:prstGeom prst="rect">
+            <a:avLst/>
+          </a:prstGeom>
+          <a:ln>
+            <a:noFill/>
+          </a:ln>
+        </p:spPr>
+        <p:style>
+          <a:lnRef idx="2">
+            <a:schemeClr val="accent1">
+              <a:shade val="50000"/>
+            </a:schemeClr>
+          </a:lnRef>
+          <a:fillRef idx="1">
+            <a:schemeClr val="accent1"/>
+          </a:fillRef>
+          <a:effectRef idx="0">
+            <a:schemeClr val="accent1"/>
+          </a:effectRef>
+          <a:fontRef idx="minor">
+            <a:schemeClr val="lt1"/>
+          </a:fontRef>
+        </p:style>
+        <p:txBody>
+          <a:bodyPr rtlCol="0" anchor="ctr"/>
+          <a:lstStyle/>
+          <a:p>
+            <a:pPr algn="ctr"/>
+            <a:endParaRPr lang="en-US" sz="1701"/>
+          </a:p>
+        </p:txBody>
+      </p:sp>
+      <p:sp>
+        <p:nvSpPr>
+          <p:cNvPr id="107" name="Rectangle 106">
+            <a:extLst>
+              <a:ext uri="{FF2B5EF4-FFF2-40B4-BE49-F238E27FC236}">
+                <a16:creationId xmlns:a16="http://schemas.microsoft.com/office/drawing/2014/main" id="{B17F76B9-BC79-B74B-835B-0D7CE409A767}"/>
+              </a:ext>
+            </a:extLst>
+          </p:cNvPr>
+          <p:cNvSpPr/>
+          <p:nvPr/>
+        </p:nvSpPr>
+        <p:spPr>
+          <a:xfrm>
+            <a:off x="213746" y="6102115"/>
+            <a:ext cx="199381" cy="177924"/>
+          </a:xfrm>
+          <a:prstGeom prst="rect">
+            <a:avLst/>
+          </a:prstGeom>
+          <a:pattFill prst="wdDnDiag">
+            <a:fgClr>
+              <a:schemeClr val="accent1">
+                <a:lumMod val="50000"/>
+              </a:schemeClr>
+            </a:fgClr>
+            <a:bgClr>
+              <a:schemeClr val="accent1"/>
+            </a:bgClr>
+          </a:pattFill>
+          <a:ln>
+            <a:noFill/>
+          </a:ln>
+        </p:spPr>
+        <p:style>
+          <a:lnRef idx="2">
+            <a:schemeClr val="accent1">
+              <a:shade val="50000"/>
+            </a:schemeClr>
+          </a:lnRef>
+          <a:fillRef idx="1">
+            <a:schemeClr val="accent1"/>
+          </a:fillRef>
+          <a:effectRef idx="0">
+            <a:schemeClr val="accent1"/>
+          </a:effectRef>
+          <a:fontRef idx="minor">
+            <a:schemeClr val="lt1"/>
+          </a:fontRef>
+        </p:style>
+        <p:txBody>
+          <a:bodyPr rtlCol="0" anchor="ctr"/>
+          <a:lstStyle/>
+          <a:p>
+            <a:pPr algn="ctr"/>
+            <a:endParaRPr lang="en-US" sz="1701"/>
+          </a:p>
+        </p:txBody>
+      </p:sp>
+      <p:sp>
+        <p:nvSpPr>
+          <p:cNvPr id="108" name="TextBox 107">
+            <a:extLst>
+              <a:ext uri="{FF2B5EF4-FFF2-40B4-BE49-F238E27FC236}">
+                <a16:creationId xmlns:a16="http://schemas.microsoft.com/office/drawing/2014/main" id="{8E3734C2-56F0-A54A-A296-BF1F0DCE812B}"/>
+              </a:ext>
+            </a:extLst>
+          </p:cNvPr>
+          <p:cNvSpPr txBox="1"/>
+          <p:nvPr/>
+        </p:nvSpPr>
+        <p:spPr>
+          <a:xfrm>
+            <a:off x="387648" y="5432111"/>
+            <a:ext cx="2063385" cy="307777"/>
+          </a:xfrm>
+          <a:prstGeom prst="rect">
+            <a:avLst/>
+          </a:prstGeom>
+          <a:noFill/>
+        </p:spPr>
+        <p:txBody>
+          <a:bodyPr wrap="none" rtlCol="0">
+            <a:spAutoFit/>
+          </a:bodyPr>
+          <a:lstStyle/>
+          <a:p>
+            <a:r>
+              <a:rPr lang="en-US" sz="1400" dirty="0"/>
+              <a:t>Full bugfix support period</a:t>
+            </a:r>
+          </a:p>
+        </p:txBody>
+      </p:sp>
+      <p:sp>
+        <p:nvSpPr>
+          <p:cNvPr id="109" name="TextBox 108">
+            <a:extLst>
+              <a:ext uri="{FF2B5EF4-FFF2-40B4-BE49-F238E27FC236}">
+                <a16:creationId xmlns:a16="http://schemas.microsoft.com/office/drawing/2014/main" id="{DED5A517-5A38-244B-88E7-4F6A6410E293}"/>
+              </a:ext>
+            </a:extLst>
+          </p:cNvPr>
+          <p:cNvSpPr txBox="1"/>
+          <p:nvPr/>
+        </p:nvSpPr>
+        <p:spPr>
+          <a:xfrm>
+            <a:off x="387647" y="5738125"/>
+            <a:ext cx="2117887" cy="307777"/>
+          </a:xfrm>
+          <a:prstGeom prst="rect">
+            <a:avLst/>
+          </a:prstGeom>
+          <a:noFill/>
+        </p:spPr>
+        <p:txBody>
+          <a:bodyPr wrap="none" rtlCol="0">
+            <a:spAutoFit/>
+          </a:bodyPr>
+          <a:lstStyle/>
+          <a:p>
+            <a:r>
+              <a:rPr lang="en-US" sz="1400" dirty="0"/>
+              <a:t>Security fix support period</a:t>
+            </a:r>
+          </a:p>
+        </p:txBody>
+      </p:sp>
+      <p:sp>
+        <p:nvSpPr>
+          <p:cNvPr id="110" name="TextBox 109">
+            <a:extLst>
+              <a:ext uri="{FF2B5EF4-FFF2-40B4-BE49-F238E27FC236}">
+                <a16:creationId xmlns:a16="http://schemas.microsoft.com/office/drawing/2014/main" id="{280AAF20-B284-D647-8F91-E462BF9DEDDE}"/>
+              </a:ext>
+            </a:extLst>
+          </p:cNvPr>
+          <p:cNvSpPr txBox="1"/>
+          <p:nvPr/>
+        </p:nvSpPr>
+        <p:spPr>
+          <a:xfrm>
+            <a:off x="378333" y="6033624"/>
+            <a:ext cx="3975768" cy="307777"/>
+          </a:xfrm>
+          <a:prstGeom prst="rect">
+            <a:avLst/>
+          </a:prstGeom>
+          <a:noFill/>
+        </p:spPr>
+        <p:txBody>
+          <a:bodyPr wrap="none" rtlCol="0">
+            <a:spAutoFit/>
+          </a:bodyPr>
+          <a:lstStyle/>
+          <a:p>
+            <a:r>
+              <a:rPr lang="en-US" sz="1400" dirty="0"/>
+              <a:t>Extended bugfix support at the discretion of the RM</a:t>
+            </a:r>
           </a:p>
         </p:txBody>
       </p:sp>
@@ -6421,7 +7190,7 @@
 <file path=ppt/theme/theme1.xml><?xml version="1.0" encoding="utf-8"?>
 <a:theme xmlns:a="http://schemas.openxmlformats.org/drawingml/2006/main" name="Office Theme">
   <a:themeElements>
-    <a:clrScheme name="Office">
+    <a:clrScheme name="Office Theme">
       <a:dk1>
         <a:sysClr val="windowText" lastClr="000000"/>
       </a:dk1>
@@ -6459,7 +7228,7 @@
         <a:srgbClr val="954F72"/>
       </a:folHlink>
     </a:clrScheme>
-    <a:fontScheme name="Office">
+    <a:fontScheme name="Office Theme">
       <a:majorFont>
         <a:latin typeface="Calibri Light" panose="020F0302020204030204"/>
         <a:ea typeface=""/>
@@ -6494,23 +7263,6 @@
         <a:font script="Viet" typeface="Times New Roman"/>
         <a:font script="Uigh" typeface="Microsoft Uighur"/>
         <a:font script="Geor" typeface="Sylfaen"/>
-        <a:font script="Armn" typeface="Arial"/>
-        <a:font script="Bugi" typeface="Leelawadee UI"/>
-        <a:font script="Bopo" typeface="Microsoft JhengHei"/>
-        <a:font script="Java" typeface="Javanese Text"/>
-        <a:font script="Lisu" typeface="Segoe UI"/>
-        <a:font script="Mymr" typeface="Myanmar Text"/>
-        <a:font script="Nkoo" typeface="Ebrima"/>
-        <a:font script="Olck" typeface="Nirmala UI"/>
-        <a:font script="Osma" typeface="Ebrima"/>
-        <a:font script="Phag" typeface="Phagspa"/>
-        <a:font script="Syrn" typeface="Estrangelo Edessa"/>
-        <a:font script="Syrj" typeface="Estrangelo Edessa"/>
-        <a:font script="Syre" typeface="Estrangelo Edessa"/>
-        <a:font script="Sora" typeface="Nirmala UI"/>
-        <a:font script="Tale" typeface="Microsoft Tai Le"/>
-        <a:font script="Talu" typeface="Microsoft New Tai Lue"/>
-        <a:font script="Tfng" typeface="Ebrima"/>
       </a:majorFont>
       <a:minorFont>
         <a:latin typeface="Calibri" panose="020F0502020204030204"/>
@@ -6546,26 +7298,9 @@
         <a:font script="Viet" typeface="Arial"/>
         <a:font script="Uigh" typeface="Microsoft Uighur"/>
         <a:font script="Geor" typeface="Sylfaen"/>
-        <a:font script="Armn" typeface="Arial"/>
-        <a:font script="Bugi" typeface="Leelawadee UI"/>
-        <a:font script="Bopo" typeface="Microsoft JhengHei"/>
-        <a:font script="Java" typeface="Javanese Text"/>
-        <a:font script="Lisu" typeface="Segoe UI"/>
-        <a:font script="Mymr" typeface="Myanmar Text"/>
-        <a:font script="Nkoo" typeface="Ebrima"/>
-        <a:font script="Olck" typeface="Nirmala UI"/>
-        <a:font script="Osma" typeface="Ebrima"/>
-        <a:font script="Phag" typeface="Phagspa"/>
-        <a:font script="Syrn" typeface="Estrangelo Edessa"/>
-        <a:font script="Syrj" typeface="Estrangelo Edessa"/>
-        <a:font script="Syre" typeface="Estrangelo Edessa"/>
-        <a:font script="Sora" typeface="Nirmala UI"/>
-        <a:font script="Tale" typeface="Microsoft Tai Le"/>
-        <a:font script="Talu" typeface="Microsoft New Tai Lue"/>
-        <a:font script="Tfng" typeface="Ebrima"/>
       </a:minorFont>
     </a:fontScheme>
-    <a:fmtScheme name="Office">
+    <a:fmtScheme name="Office Theme">
       <a:fillStyleLst>
         <a:solidFill>
           <a:schemeClr val="phClr"/>

</xml_diff>